<commit_message>
* updated & edited ppt
</commit_message>
<xml_diff>
--- a/Senior Project Files/Time Warrior.pptx
+++ b/Senior Project Files/Time Warrior.pptx
@@ -15,12 +15,12 @@
     <p:sldId id="259" r:id="rId6"/>
     <p:sldId id="260" r:id="rId7"/>
     <p:sldId id="261" r:id="rId8"/>
-    <p:sldId id="272" r:id="rId9"/>
-    <p:sldId id="273" r:id="rId10"/>
+    <p:sldId id="273" r:id="rId9"/>
+    <p:sldId id="272" r:id="rId10"/>
     <p:sldId id="274" r:id="rId11"/>
     <p:sldId id="264" r:id="rId12"/>
-    <p:sldId id="269" r:id="rId13"/>
-    <p:sldId id="270" r:id="rId14"/>
+    <p:sldId id="270" r:id="rId13"/>
+    <p:sldId id="269" r:id="rId14"/>
     <p:sldId id="275" r:id="rId15"/>
     <p:sldId id="276" r:id="rId16"/>
     <p:sldId id="277" r:id="rId17"/>
@@ -207,7 +207,8 @@
           <a:p>
             <a:fld id="{FDA7BB9C-8931-4132-81CE-068281051B41}" type="datetimeFigureOut">
               <a:rPr lang="en-US" smtClean="0"/>
-              <a:t>6/17/2011</a:t>
+              <a:pPr/>
+              <a:t>6/19/2011</a:t>
             </a:fld>
             <a:endParaRPr lang="en-US"/>
           </a:p>
@@ -368,6 +369,7 @@
           <a:p>
             <a:fld id="{650E58FB-5A29-442E-9529-C307D7A41024}" type="slidenum">
               <a:rPr lang="en-US" smtClean="0"/>
+              <a:pPr/>
               <a:t>‹#›</a:t>
             </a:fld>
             <a:endParaRPr lang="en-US"/>
@@ -543,6 +545,7 @@
           <a:p>
             <a:fld id="{650E58FB-5A29-442E-9529-C307D7A41024}" type="slidenum">
               <a:rPr lang="en-US" smtClean="0"/>
+              <a:pPr/>
               <a:t>1</a:t>
             </a:fld>
             <a:endParaRPr lang="en-US"/>
@@ -628,6 +631,7 @@
           <a:p>
             <a:fld id="{650E58FB-5A29-442E-9529-C307D7A41024}" type="slidenum">
               <a:rPr lang="en-US" smtClean="0"/>
+              <a:pPr/>
               <a:t>10</a:t>
             </a:fld>
             <a:endParaRPr lang="en-US"/>
@@ -717,6 +721,7 @@
           <a:p>
             <a:fld id="{650E58FB-5A29-442E-9529-C307D7A41024}" type="slidenum">
               <a:rPr lang="en-US" smtClean="0"/>
+              <a:pPr/>
               <a:t>11</a:t>
             </a:fld>
             <a:endParaRPr lang="en-US"/>
@@ -806,6 +811,7 @@
           <a:p>
             <a:fld id="{650E58FB-5A29-442E-9529-C307D7A41024}" type="slidenum">
               <a:rPr lang="en-US" smtClean="0"/>
+              <a:pPr/>
               <a:t>14</a:t>
             </a:fld>
             <a:endParaRPr lang="en-US"/>
@@ -891,6 +897,7 @@
           <a:p>
             <a:fld id="{650E58FB-5A29-442E-9529-C307D7A41024}" type="slidenum">
               <a:rPr lang="en-US" smtClean="0"/>
+              <a:pPr/>
               <a:t>15</a:t>
             </a:fld>
             <a:endParaRPr lang="en-US"/>
@@ -980,6 +987,7 @@
           <a:p>
             <a:fld id="{650E58FB-5A29-442E-9529-C307D7A41024}" type="slidenum">
               <a:rPr lang="en-US" smtClean="0"/>
+              <a:pPr/>
               <a:t>16</a:t>
             </a:fld>
             <a:endParaRPr lang="en-US"/>
@@ -1065,6 +1073,7 @@
           <a:p>
             <a:fld id="{650E58FB-5A29-442E-9529-C307D7A41024}" type="slidenum">
               <a:rPr lang="en-US" smtClean="0"/>
+              <a:pPr/>
               <a:t>2</a:t>
             </a:fld>
             <a:endParaRPr lang="en-US"/>
@@ -1154,6 +1163,7 @@
           <a:p>
             <a:fld id="{650E58FB-5A29-442E-9529-C307D7A41024}" type="slidenum">
               <a:rPr lang="en-US" smtClean="0"/>
+              <a:pPr/>
               <a:t>3</a:t>
             </a:fld>
             <a:endParaRPr lang="en-US"/>
@@ -1249,6 +1259,7 @@
           <a:p>
             <a:fld id="{650E58FB-5A29-442E-9529-C307D7A41024}" type="slidenum">
               <a:rPr lang="en-US" smtClean="0"/>
+              <a:pPr/>
               <a:t>4</a:t>
             </a:fld>
             <a:endParaRPr lang="en-US"/>
@@ -1344,6 +1355,7 @@
           <a:p>
             <a:fld id="{650E58FB-5A29-442E-9529-C307D7A41024}" type="slidenum">
               <a:rPr lang="en-US" smtClean="0"/>
+              <a:pPr/>
               <a:t>5</a:t>
             </a:fld>
             <a:endParaRPr lang="en-US"/>
@@ -1433,6 +1445,7 @@
           <a:p>
             <a:fld id="{650E58FB-5A29-442E-9529-C307D7A41024}" type="slidenum">
               <a:rPr lang="en-US" smtClean="0"/>
+              <a:pPr/>
               <a:t>6</a:t>
             </a:fld>
             <a:endParaRPr lang="en-US"/>
@@ -1518,6 +1531,7 @@
           <a:p>
             <a:fld id="{650E58FB-5A29-442E-9529-C307D7A41024}" type="slidenum">
               <a:rPr lang="en-US" smtClean="0"/>
+              <a:pPr/>
               <a:t>7</a:t>
             </a:fld>
             <a:endParaRPr lang="en-US"/>
@@ -1580,7 +1594,11 @@
           <a:p>
             <a:r>
               <a:rPr lang="en-US" dirty="0" smtClean="0"/>
-              <a:t>John’s Slide</a:t>
+              <a:t>Matt’s Slide: RUN.</a:t>
+            </a:r>
+            <a:r>
+              <a:rPr lang="en-US" baseline="0" dirty="0" smtClean="0"/>
+              <a:t> LIKE HELL.</a:t>
             </a:r>
             <a:endParaRPr lang="en-US" dirty="0"/>
           </a:p>
@@ -1603,6 +1621,7 @@
           <a:p>
             <a:fld id="{650E58FB-5A29-442E-9529-C307D7A41024}" type="slidenum">
               <a:rPr lang="en-US" smtClean="0"/>
+              <a:pPr/>
               <a:t>8</a:t>
             </a:fld>
             <a:endParaRPr lang="en-US"/>
@@ -1665,11 +1684,7 @@
           <a:p>
             <a:r>
               <a:rPr lang="en-US" dirty="0" smtClean="0"/>
-              <a:t>Matt’s Slide: RUN.</a:t>
-            </a:r>
-            <a:r>
-              <a:rPr lang="en-US" baseline="0" dirty="0" smtClean="0"/>
-              <a:t> LIKE HELL.</a:t>
+              <a:t>John’s Slide</a:t>
             </a:r>
             <a:endParaRPr lang="en-US" dirty="0"/>
           </a:p>
@@ -1692,6 +1707,7 @@
           <a:p>
             <a:fld id="{650E58FB-5A29-442E-9529-C307D7A41024}" type="slidenum">
               <a:rPr lang="en-US" smtClean="0"/>
+              <a:pPr/>
               <a:t>9</a:t>
             </a:fld>
             <a:endParaRPr lang="en-US"/>
@@ -2091,7 +2107,7 @@
             <a:fld id="{43D57B9B-B8D0-4621-A0A3-A98D4B06B1CD}" type="datetimeFigureOut">
               <a:rPr lang="en-US" smtClean="0"/>
               <a:pPr/>
-              <a:t>6/17/2011</a:t>
+              <a:t>6/19/2011</a:t>
             </a:fld>
             <a:endParaRPr lang="en-US"/>
           </a:p>
@@ -2258,7 +2274,7 @@
             <a:fld id="{43D57B9B-B8D0-4621-A0A3-A98D4B06B1CD}" type="datetimeFigureOut">
               <a:rPr lang="en-US" smtClean="0"/>
               <a:pPr/>
-              <a:t>6/17/2011</a:t>
+              <a:t>6/19/2011</a:t>
             </a:fld>
             <a:endParaRPr lang="en-US"/>
           </a:p>
@@ -2435,7 +2451,7 @@
             <a:fld id="{43D57B9B-B8D0-4621-A0A3-A98D4B06B1CD}" type="datetimeFigureOut">
               <a:rPr lang="en-US" smtClean="0"/>
               <a:pPr/>
-              <a:t>6/17/2011</a:t>
+              <a:t>6/19/2011</a:t>
             </a:fld>
             <a:endParaRPr lang="en-US"/>
           </a:p>
@@ -2606,7 +2622,7 @@
             <a:fld id="{43D57B9B-B8D0-4621-A0A3-A98D4B06B1CD}" type="datetimeFigureOut">
               <a:rPr lang="en-US" smtClean="0"/>
               <a:pPr/>
-              <a:t>6/17/2011</a:t>
+              <a:t>6/19/2011</a:t>
             </a:fld>
             <a:endParaRPr lang="en-US"/>
           </a:p>
@@ -3063,7 +3079,7 @@
             <a:fld id="{43D57B9B-B8D0-4621-A0A3-A98D4B06B1CD}" type="datetimeFigureOut">
               <a:rPr lang="en-US" smtClean="0"/>
               <a:pPr/>
-              <a:t>6/17/2011</a:t>
+              <a:t>6/19/2011</a:t>
             </a:fld>
             <a:endParaRPr lang="en-US"/>
           </a:p>
@@ -3329,7 +3345,7 @@
             <a:fld id="{43D57B9B-B8D0-4621-A0A3-A98D4B06B1CD}" type="datetimeFigureOut">
               <a:rPr lang="en-US" smtClean="0"/>
               <a:pPr/>
-              <a:t>6/17/2011</a:t>
+              <a:t>6/19/2011</a:t>
             </a:fld>
             <a:endParaRPr lang="en-US"/>
           </a:p>
@@ -3705,7 +3721,7 @@
             <a:fld id="{43D57B9B-B8D0-4621-A0A3-A98D4B06B1CD}" type="datetimeFigureOut">
               <a:rPr lang="en-US" smtClean="0"/>
               <a:pPr/>
-              <a:t>6/17/2011</a:t>
+              <a:t>6/19/2011</a:t>
             </a:fld>
             <a:endParaRPr lang="en-US"/>
           </a:p>
@@ -3829,7 +3845,7 @@
             <a:fld id="{43D57B9B-B8D0-4621-A0A3-A98D4B06B1CD}" type="datetimeFigureOut">
               <a:rPr lang="en-US" smtClean="0"/>
               <a:pPr/>
-              <a:t>6/17/2011</a:t>
+              <a:t>6/19/2011</a:t>
             </a:fld>
             <a:endParaRPr lang="en-US"/>
           </a:p>
@@ -3921,7 +3937,7 @@
             <a:fld id="{43D57B9B-B8D0-4621-A0A3-A98D4B06B1CD}" type="datetimeFigureOut">
               <a:rPr lang="en-US" smtClean="0"/>
               <a:pPr/>
-              <a:t>6/17/2011</a:t>
+              <a:t>6/19/2011</a:t>
             </a:fld>
             <a:endParaRPr lang="en-US"/>
           </a:p>
@@ -4172,7 +4188,7 @@
             <a:fld id="{43D57B9B-B8D0-4621-A0A3-A98D4B06B1CD}" type="datetimeFigureOut">
               <a:rPr lang="en-US" smtClean="0"/>
               <a:pPr/>
-              <a:t>6/17/2011</a:t>
+              <a:t>6/19/2011</a:t>
             </a:fld>
             <a:endParaRPr lang="en-US"/>
           </a:p>
@@ -4433,7 +4449,7 @@
             <a:fld id="{43D57B9B-B8D0-4621-A0A3-A98D4B06B1CD}" type="datetimeFigureOut">
               <a:rPr lang="en-US" smtClean="0"/>
               <a:pPr/>
-              <a:t>6/17/2011</a:t>
+              <a:t>6/19/2011</a:t>
             </a:fld>
             <a:endParaRPr lang="en-US"/>
           </a:p>
@@ -4839,7 +4855,7 @@
             <a:fld id="{43D57B9B-B8D0-4621-A0A3-A98D4B06B1CD}" type="datetimeFigureOut">
               <a:rPr lang="en-US" smtClean="0"/>
               <a:pPr/>
-              <a:t>6/17/2011</a:t>
+              <a:t>6/19/2011</a:t>
             </a:fld>
             <a:endParaRPr lang="en-US"/>
           </a:p>
@@ -5295,14 +5311,19 @@
           <a:p>
             <a:r>
               <a:rPr lang="en-US" dirty="0" smtClean="0"/>
-              <a:t>John Parks</a:t>
-            </a:r>
-          </a:p>
-          <a:p>
-            <a:r>
-              <a:rPr lang="en-US" dirty="0" smtClean="0"/>
-              <a:t>Matt Morrill</a:t>
-            </a:r>
+              <a:t>Matthew Morrill</a:t>
+            </a:r>
+          </a:p>
+          <a:p>
+            <a:r>
+              <a:rPr lang="en-US" dirty="0" smtClean="0"/>
+              <a:t>John </a:t>
+            </a:r>
+            <a:r>
+              <a:rPr lang="en-US" dirty="0" smtClean="0"/>
+              <a:t>Parks</a:t>
+            </a:r>
+            <a:endParaRPr lang="en-US" dirty="0" smtClean="0"/>
           </a:p>
           <a:p>
             <a:r>
@@ -5393,6 +5414,13 @@
   <p:clrMapOvr>
     <a:masterClrMapping/>
   </p:clrMapOvr>
+  <p:timing>
+    <p:tnLst>
+      <p:par>
+        <p:cTn id="1" dur="indefinite" restart="never" nodeType="tmRoot"/>
+      </p:par>
+    </p:tnLst>
+  </p:timing>
 </p:sld>
 </file>
 
@@ -5428,7 +5456,6 @@
           <a:bodyPr/>
           <a:lstStyle/>
           <a:p>
-            <a:pPr algn="ctr"/>
             <a:r>
               <a:rPr lang="en-US" dirty="0" smtClean="0"/>
               <a:t>Map Comparisons</a:t>
@@ -5476,7 +5503,7 @@
         </p:blipFill>
         <p:spPr>
           <a:xfrm>
-            <a:off x="1524000" y="2151343"/>
+            <a:off x="1562100" y="2151343"/>
             <a:ext cx="6019800" cy="4706657"/>
           </a:xfrm>
           <a:prstGeom prst="rect">
@@ -5534,76 +5561,161 @@
           <a:p>
             <a:r>
               <a:rPr lang="en-US" dirty="0" smtClean="0"/>
-              <a:t>Skills - Weapons</a:t>
+              <a:t>Skills - Magic</a:t>
             </a:r>
             <a:endParaRPr lang="en-US" dirty="0"/>
           </a:p>
         </p:txBody>
       </p:sp>
-      <p:sp>
-        <p:nvSpPr>
-          <p:cNvPr id="3" name="Content Placeholder 2"/>
-          <p:cNvSpPr>
-            <a:spLocks noGrp="1"/>
-          </p:cNvSpPr>
+      <p:graphicFrame>
+        <p:nvGraphicFramePr>
+          <p:cNvPr id="13" name="Content Placeholder 12"/>
+          <p:cNvGraphicFramePr>
+            <a:graphicFrameLocks noGrp="1"/>
+          </p:cNvGraphicFramePr>
           <p:nvPr>
             <p:ph idx="1"/>
           </p:nvPr>
-        </p:nvSpPr>
-        <p:spPr/>
-        <p:txBody>
-          <a:bodyPr/>
-          <a:lstStyle/>
-          <a:p>
-            <a:pPr>
-              <a:lnSpc>
-                <a:spcPct val="200000"/>
-              </a:lnSpc>
-            </a:pPr>
-            <a:r>
-              <a:rPr lang="en-US" dirty="0" smtClean="0"/>
-              <a:t>Slash</a:t>
-            </a:r>
-          </a:p>
-          <a:p>
-            <a:pPr>
-              <a:lnSpc>
-                <a:spcPct val="200000"/>
-              </a:lnSpc>
-            </a:pPr>
-            <a:r>
-              <a:rPr lang="en-US" dirty="0" smtClean="0"/>
-              <a:t>Blunt</a:t>
-            </a:r>
-          </a:p>
-          <a:p>
-            <a:pPr>
-              <a:lnSpc>
-                <a:spcPct val="200000"/>
-              </a:lnSpc>
-            </a:pPr>
-            <a:r>
-              <a:rPr lang="en-US" dirty="0" smtClean="0"/>
-              <a:t>Peirce</a:t>
-            </a:r>
-          </a:p>
-          <a:p>
-            <a:pPr>
-              <a:lnSpc>
-                <a:spcPct val="200000"/>
-              </a:lnSpc>
-            </a:pPr>
-            <a:r>
-              <a:rPr lang="en-US" dirty="0" smtClean="0"/>
-              <a:t>Ranged</a:t>
-            </a:r>
-            <a:endParaRPr lang="en-US" dirty="0"/>
-          </a:p>
-        </p:txBody>
-      </p:sp>
+        </p:nvGraphicFramePr>
+        <p:xfrm>
+          <a:off x="838200" y="1600200"/>
+          <a:ext cx="7467600" cy="741680"/>
+        </p:xfrm>
+        <a:graphic>
+          <a:graphicData uri="http://schemas.openxmlformats.org/drawingml/2006/table">
+            <a:tbl>
+              <a:tblPr firstRow="1" bandRow="1">
+                <a:tableStyleId>{5C22544A-7EE6-4342-B048-85BDC9FD1C3A}</a:tableStyleId>
+              </a:tblPr>
+              <a:tblGrid>
+                <a:gridCol w="1866900"/>
+                <a:gridCol w="1866900"/>
+                <a:gridCol w="1866900"/>
+                <a:gridCol w="1866900"/>
+              </a:tblGrid>
+              <a:tr h="370840">
+                <a:tc>
+                  <a:txBody>
+                    <a:bodyPr/>
+                    <a:lstStyle/>
+                    <a:p>
+                      <a:r>
+                        <a:rPr lang="en-US" dirty="0" smtClean="0"/>
+                        <a:t>Divine</a:t>
+                      </a:r>
+                      <a:endParaRPr lang="en-US" dirty="0"/>
+                    </a:p>
+                  </a:txBody>
+                  <a:tcPr/>
+                </a:tc>
+                <a:tc>
+                  <a:txBody>
+                    <a:bodyPr/>
+                    <a:lstStyle/>
+                    <a:p>
+                      <a:r>
+                        <a:rPr lang="en-US" dirty="0" smtClean="0"/>
+                        <a:t>Lightning</a:t>
+                      </a:r>
+                      <a:endParaRPr lang="en-US" dirty="0"/>
+                    </a:p>
+                  </a:txBody>
+                  <a:tcPr/>
+                </a:tc>
+                <a:tc>
+                  <a:txBody>
+                    <a:bodyPr/>
+                    <a:lstStyle/>
+                    <a:p>
+                      <a:r>
+                        <a:rPr lang="en-US" dirty="0" smtClean="0"/>
+                        <a:t>Fire</a:t>
+                      </a:r>
+                      <a:endParaRPr lang="en-US" dirty="0"/>
+                    </a:p>
+                  </a:txBody>
+                  <a:tcPr/>
+                </a:tc>
+                <a:tc>
+                  <a:txBody>
+                    <a:bodyPr/>
+                    <a:lstStyle/>
+                    <a:p>
+                      <a:r>
+                        <a:rPr lang="en-US" dirty="0" smtClean="0"/>
+                        <a:t>Ice</a:t>
+                      </a:r>
+                      <a:endParaRPr lang="en-US" dirty="0"/>
+                    </a:p>
+                  </a:txBody>
+                  <a:tcPr/>
+                </a:tc>
+              </a:tr>
+              <a:tr h="370840">
+                <a:tc>
+                  <a:txBody>
+                    <a:bodyPr/>
+                    <a:lstStyle/>
+                    <a:p>
+                      <a:r>
+                        <a:rPr lang="en-US" dirty="0" smtClean="0"/>
+                        <a:t>Heal</a:t>
+                      </a:r>
+                      <a:endParaRPr lang="en-US" dirty="0"/>
+                    </a:p>
+                  </a:txBody>
+                  <a:tcPr/>
+                </a:tc>
+                <a:tc>
+                  <a:txBody>
+                    <a:bodyPr/>
+                    <a:lstStyle/>
+                    <a:p>
+                      <a:r>
+                        <a:rPr lang="en-US" dirty="0" smtClean="0"/>
+                        <a:t>Critical Chance</a:t>
+                      </a:r>
+                      <a:endParaRPr lang="en-US" dirty="0"/>
+                    </a:p>
+                  </a:txBody>
+                  <a:tcPr/>
+                </a:tc>
+                <a:tc>
+                  <a:txBody>
+                    <a:bodyPr/>
+                    <a:lstStyle/>
+                    <a:p>
+                      <a:r>
+                        <a:rPr lang="en-US" dirty="0" smtClean="0"/>
+                        <a:t>High Damage</a:t>
+                      </a:r>
+                      <a:endParaRPr lang="en-US" dirty="0"/>
+                    </a:p>
+                  </a:txBody>
+                  <a:tcPr/>
+                </a:tc>
+                <a:tc>
+                  <a:txBody>
+                    <a:bodyPr/>
+                    <a:lstStyle/>
+                    <a:p>
+                      <a:r>
+                        <a:rPr lang="en-US" dirty="0" smtClean="0"/>
+                        <a:t>Freeze DOT</a:t>
+                      </a:r>
+                      <a:endParaRPr lang="en-US" dirty="0"/>
+                    </a:p>
+                  </a:txBody>
+                  <a:tcPr/>
+                </a:tc>
+              </a:tr>
+            </a:tbl>
+          </a:graphicData>
+        </a:graphic>
+      </p:graphicFrame>
       <p:pic>
         <p:nvPicPr>
-          <p:cNvPr id="4" name="Picture 3" descr="weapon_blunt.bmp"/>
+          <p:cNvPr id="14" name="Picture 13" descr="magic.bmp"/>
           <p:cNvPicPr>
             <a:picLocks noChangeAspect="1"/>
           </p:cNvPicPr>
@@ -5617,80 +5729,8 @@
         </p:blipFill>
         <p:spPr>
           <a:xfrm>
-            <a:off x="4038600" y="2895600"/>
-            <a:ext cx="1676400" cy="1117600"/>
-          </a:xfrm>
-          <a:prstGeom prst="rect">
-            <a:avLst/>
-          </a:prstGeom>
-        </p:spPr>
-      </p:pic>
-      <p:pic>
-        <p:nvPicPr>
-          <p:cNvPr id="5" name="Picture 4" descr="weapon_pierce.bmp"/>
-          <p:cNvPicPr>
-            <a:picLocks noChangeAspect="1"/>
-          </p:cNvPicPr>
-          <p:nvPr/>
-        </p:nvPicPr>
-        <p:blipFill>
-          <a:blip r:embed="rId3" cstate="print"/>
-          <a:stretch>
-            <a:fillRect/>
-          </a:stretch>
-        </p:blipFill>
-        <p:spPr>
-          <a:xfrm rot="5400000">
-            <a:off x="4686300" y="3390901"/>
-            <a:ext cx="1295401" cy="2590802"/>
-          </a:xfrm>
-          <a:prstGeom prst="rect">
-            <a:avLst/>
-          </a:prstGeom>
-        </p:spPr>
-      </p:pic>
-      <p:pic>
-        <p:nvPicPr>
-          <p:cNvPr id="6" name="Picture 5" descr="weapon_range.bmp"/>
-          <p:cNvPicPr>
-            <a:picLocks noChangeAspect="1"/>
-          </p:cNvPicPr>
-          <p:nvPr/>
-        </p:nvPicPr>
-        <p:blipFill>
-          <a:blip r:embed="rId4" cstate="print"/>
-          <a:stretch>
-            <a:fillRect/>
-          </a:stretch>
-        </p:blipFill>
-        <p:spPr>
-          <a:xfrm>
-            <a:off x="4572000" y="5410200"/>
-            <a:ext cx="1447800" cy="1447800"/>
-          </a:xfrm>
-          <a:prstGeom prst="rect">
-            <a:avLst/>
-          </a:prstGeom>
-        </p:spPr>
-      </p:pic>
-      <p:pic>
-        <p:nvPicPr>
-          <p:cNvPr id="7" name="Picture 6" descr="weapon_slash.bmp"/>
-          <p:cNvPicPr>
-            <a:picLocks noChangeAspect="1"/>
-          </p:cNvPicPr>
-          <p:nvPr/>
-        </p:nvPicPr>
-        <p:blipFill>
-          <a:blip r:embed="rId5" cstate="print"/>
-          <a:stretch>
-            <a:fillRect/>
-          </a:stretch>
-        </p:blipFill>
-        <p:spPr>
-          <a:xfrm>
-            <a:off x="4038600" y="1676400"/>
-            <a:ext cx="1828800" cy="1219200"/>
+            <a:off x="914400" y="2514600"/>
+            <a:ext cx="7315200" cy="1828800"/>
           </a:xfrm>
           <a:prstGeom prst="rect">
             <a:avLst/>
@@ -5702,7 +5742,7 @@
   <p:clrMapOvr>
     <a:masterClrMapping/>
   </p:clrMapOvr>
-  <p:transition advTm="4883"/>
+  <p:transition advTm="16"/>
   <p:timing>
     <p:tnLst>
       <p:par>
@@ -5747,76 +5787,161 @@
           <a:p>
             <a:r>
               <a:rPr lang="en-US" dirty="0" smtClean="0"/>
-              <a:t>Skills - Magic</a:t>
+              <a:t>Skills - Weapons</a:t>
             </a:r>
             <a:endParaRPr lang="en-US" dirty="0"/>
           </a:p>
         </p:txBody>
       </p:sp>
-      <p:sp>
-        <p:nvSpPr>
-          <p:cNvPr id="3" name="Content Placeholder 2"/>
-          <p:cNvSpPr>
-            <a:spLocks noGrp="1"/>
-          </p:cNvSpPr>
+      <p:graphicFrame>
+        <p:nvGraphicFramePr>
+          <p:cNvPr id="8" name="Content Placeholder 7"/>
+          <p:cNvGraphicFramePr>
+            <a:graphicFrameLocks noGrp="1"/>
+          </p:cNvGraphicFramePr>
           <p:nvPr>
             <p:ph idx="1"/>
           </p:nvPr>
-        </p:nvSpPr>
-        <p:spPr/>
-        <p:txBody>
-          <a:bodyPr/>
-          <a:lstStyle/>
-          <a:p>
-            <a:pPr>
-              <a:lnSpc>
-                <a:spcPct val="200000"/>
-              </a:lnSpc>
-            </a:pPr>
-            <a:r>
-              <a:rPr lang="en-US" dirty="0" smtClean="0"/>
-              <a:t>Fire</a:t>
-            </a:r>
-          </a:p>
-          <a:p>
-            <a:pPr>
-              <a:lnSpc>
-                <a:spcPct val="200000"/>
-              </a:lnSpc>
-            </a:pPr>
-            <a:r>
-              <a:rPr lang="en-US" dirty="0" smtClean="0"/>
-              <a:t>Ice</a:t>
-            </a:r>
-          </a:p>
-          <a:p>
-            <a:pPr>
-              <a:lnSpc>
-                <a:spcPct val="200000"/>
-              </a:lnSpc>
-            </a:pPr>
-            <a:r>
-              <a:rPr lang="en-US" dirty="0" smtClean="0"/>
-              <a:t>Lightning</a:t>
-            </a:r>
-          </a:p>
-          <a:p>
-            <a:pPr>
-              <a:lnSpc>
-                <a:spcPct val="200000"/>
-              </a:lnSpc>
-            </a:pPr>
-            <a:r>
-              <a:rPr lang="en-US" dirty="0" smtClean="0"/>
-              <a:t>Divine</a:t>
-            </a:r>
-            <a:endParaRPr lang="en-US" dirty="0"/>
-          </a:p>
-        </p:txBody>
-      </p:sp>
+        </p:nvGraphicFramePr>
+        <p:xfrm>
+          <a:off x="838200" y="1600200"/>
+          <a:ext cx="7467600" cy="741680"/>
+        </p:xfrm>
+        <a:graphic>
+          <a:graphicData uri="http://schemas.openxmlformats.org/drawingml/2006/table">
+            <a:tbl>
+              <a:tblPr firstRow="1" bandRow="1">
+                <a:tableStyleId>{5C22544A-7EE6-4342-B048-85BDC9FD1C3A}</a:tableStyleId>
+              </a:tblPr>
+              <a:tblGrid>
+                <a:gridCol w="1866900"/>
+                <a:gridCol w="1866900"/>
+                <a:gridCol w="1866900"/>
+                <a:gridCol w="1866900"/>
+              </a:tblGrid>
+              <a:tr h="370840">
+                <a:tc>
+                  <a:txBody>
+                    <a:bodyPr/>
+                    <a:lstStyle/>
+                    <a:p>
+                      <a:r>
+                        <a:rPr lang="en-US" dirty="0" smtClean="0"/>
+                        <a:t>Blunt</a:t>
+                      </a:r>
+                      <a:endParaRPr lang="en-US" dirty="0"/>
+                    </a:p>
+                  </a:txBody>
+                  <a:tcPr/>
+                </a:tc>
+                <a:tc>
+                  <a:txBody>
+                    <a:bodyPr/>
+                    <a:lstStyle/>
+                    <a:p>
+                      <a:r>
+                        <a:rPr lang="en-US" dirty="0" smtClean="0"/>
+                        <a:t>Range</a:t>
+                      </a:r>
+                      <a:endParaRPr lang="en-US" dirty="0"/>
+                    </a:p>
+                  </a:txBody>
+                  <a:tcPr/>
+                </a:tc>
+                <a:tc>
+                  <a:txBody>
+                    <a:bodyPr/>
+                    <a:lstStyle/>
+                    <a:p>
+                      <a:r>
+                        <a:rPr lang="en-US" dirty="0" smtClean="0"/>
+                        <a:t>Slash</a:t>
+                      </a:r>
+                      <a:endParaRPr lang="en-US" dirty="0"/>
+                    </a:p>
+                  </a:txBody>
+                  <a:tcPr/>
+                </a:tc>
+                <a:tc>
+                  <a:txBody>
+                    <a:bodyPr/>
+                    <a:lstStyle/>
+                    <a:p>
+                      <a:r>
+                        <a:rPr lang="en-US" dirty="0" smtClean="0"/>
+                        <a:t>Pierce</a:t>
+                      </a:r>
+                      <a:endParaRPr lang="en-US" dirty="0"/>
+                    </a:p>
+                  </a:txBody>
+                  <a:tcPr/>
+                </a:tc>
+              </a:tr>
+              <a:tr h="370840">
+                <a:tc>
+                  <a:txBody>
+                    <a:bodyPr/>
+                    <a:lstStyle/>
+                    <a:p>
+                      <a:r>
+                        <a:rPr lang="en-US" dirty="0" smtClean="0"/>
+                        <a:t>Knockback</a:t>
+                      </a:r>
+                      <a:endParaRPr lang="en-US" dirty="0"/>
+                    </a:p>
+                  </a:txBody>
+                  <a:tcPr/>
+                </a:tc>
+                <a:tc>
+                  <a:txBody>
+                    <a:bodyPr/>
+                    <a:lstStyle/>
+                    <a:p>
+                      <a:r>
+                        <a:rPr lang="en-US" dirty="0" smtClean="0"/>
+                        <a:t>Projectile</a:t>
+                      </a:r>
+                      <a:endParaRPr lang="en-US" dirty="0"/>
+                    </a:p>
+                  </a:txBody>
+                  <a:tcPr/>
+                </a:tc>
+                <a:tc>
+                  <a:txBody>
+                    <a:bodyPr/>
+                    <a:lstStyle/>
+                    <a:p>
+                      <a:r>
+                        <a:rPr lang="en-US" dirty="0" smtClean="0"/>
+                        <a:t>High Damage</a:t>
+                      </a:r>
+                      <a:endParaRPr lang="en-US" dirty="0"/>
+                    </a:p>
+                  </a:txBody>
+                  <a:tcPr/>
+                </a:tc>
+                <a:tc>
+                  <a:txBody>
+                    <a:bodyPr/>
+                    <a:lstStyle/>
+                    <a:p>
+                      <a:r>
+                        <a:rPr lang="en-US" dirty="0" smtClean="0"/>
+                        <a:t>Critical Chance</a:t>
+                      </a:r>
+                      <a:endParaRPr lang="en-US" dirty="0"/>
+                    </a:p>
+                  </a:txBody>
+                  <a:tcPr/>
+                </a:tc>
+              </a:tr>
+            </a:tbl>
+          </a:graphicData>
+        </a:graphic>
+      </p:graphicFrame>
       <p:pic>
         <p:nvPicPr>
-          <p:cNvPr id="4" name="Picture 3" descr="magic_divine.bmp"/>
+          <p:cNvPr id="10" name="Picture 9" descr="weapon.bmp"/>
           <p:cNvPicPr>
             <a:picLocks noChangeAspect="1"/>
           </p:cNvPicPr>
@@ -5824,90 +5949,14 @@
         </p:nvPicPr>
         <p:blipFill>
           <a:blip r:embed="rId2" cstate="print"/>
-          <a:srcRect b="25000"/>
           <a:stretch>
             <a:fillRect/>
           </a:stretch>
         </p:blipFill>
         <p:spPr>
           <a:xfrm>
-            <a:off x="4800600" y="5257800"/>
-            <a:ext cx="1295400" cy="1295400"/>
-          </a:xfrm>
-          <a:prstGeom prst="rect">
-            <a:avLst/>
-          </a:prstGeom>
-        </p:spPr>
-      </p:pic>
-      <p:pic>
-        <p:nvPicPr>
-          <p:cNvPr id="5" name="Picture 4" descr="magic_lightning.bmp"/>
-          <p:cNvPicPr>
-            <a:picLocks noChangeAspect="1"/>
-          </p:cNvPicPr>
-          <p:nvPr/>
-        </p:nvPicPr>
-        <p:blipFill>
-          <a:blip r:embed="rId3" cstate="print"/>
-          <a:srcRect b="22059"/>
-          <a:stretch>
-            <a:fillRect/>
-          </a:stretch>
-        </p:blipFill>
-        <p:spPr>
-          <a:xfrm>
-            <a:off x="4800600" y="3962400"/>
-            <a:ext cx="1295400" cy="1346200"/>
-          </a:xfrm>
-          <a:prstGeom prst="rect">
-            <a:avLst/>
-          </a:prstGeom>
-        </p:spPr>
-      </p:pic>
-      <p:pic>
-        <p:nvPicPr>
-          <p:cNvPr id="6" name="Picture 5" descr="magic_fire.bmp"/>
-          <p:cNvPicPr>
-            <a:picLocks noChangeAspect="1"/>
-          </p:cNvPicPr>
-          <p:nvPr/>
-        </p:nvPicPr>
-        <p:blipFill>
-          <a:blip r:embed="rId4" cstate="print"/>
-          <a:srcRect b="25000"/>
-          <a:stretch>
-            <a:fillRect/>
-          </a:stretch>
-        </p:blipFill>
-        <p:spPr>
-          <a:xfrm>
-            <a:off x="4800600" y="1371600"/>
-            <a:ext cx="1295400" cy="1295400"/>
-          </a:xfrm>
-          <a:prstGeom prst="rect">
-            <a:avLst/>
-          </a:prstGeom>
-        </p:spPr>
-      </p:pic>
-      <p:pic>
-        <p:nvPicPr>
-          <p:cNvPr id="7" name="Picture 6" descr="magic_ice.bmp"/>
-          <p:cNvPicPr>
-            <a:picLocks noChangeAspect="1"/>
-          </p:cNvPicPr>
-          <p:nvPr/>
-        </p:nvPicPr>
-        <p:blipFill>
-          <a:blip r:embed="rId5" cstate="print"/>
-          <a:srcRect b="25000"/>
-          <a:stretch>
-            <a:fillRect/>
-          </a:stretch>
-        </p:blipFill>
-        <p:spPr>
-          <a:xfrm>
-            <a:off x="4800600" y="2667000"/>
-            <a:ext cx="1295400" cy="1295400"/>
+            <a:off x="914400" y="2514600"/>
+            <a:ext cx="7315200" cy="1828801"/>
           </a:xfrm>
           <a:prstGeom prst="rect">
             <a:avLst/>
@@ -5919,7 +5968,7 @@
   <p:clrMapOvr>
     <a:masterClrMapping/>
   </p:clrMapOvr>
-  <p:transition advTm="16"/>
+  <p:transition advTm="4883"/>
   <p:timing>
     <p:tnLst>
       <p:par>
@@ -5972,50 +6021,181 @@
       </p:sp>
       <p:sp>
         <p:nvSpPr>
+          <p:cNvPr id="4" name="Text Placeholder 3"/>
+          <p:cNvSpPr>
+            <a:spLocks noGrp="1"/>
+          </p:cNvSpPr>
+          <p:nvPr>
+            <p:ph type="body" idx="1"/>
+          </p:nvPr>
+        </p:nvSpPr>
+        <p:spPr/>
+        <p:txBody>
+          <a:bodyPr/>
+          <a:lstStyle/>
+          <a:p>
+            <a:r>
+              <a:rPr lang="en-US" dirty="0" smtClean="0"/>
+              <a:t>Did Get In</a:t>
+            </a:r>
+            <a:endParaRPr lang="en-US" dirty="0"/>
+          </a:p>
+        </p:txBody>
+      </p:sp>
+      <p:sp>
+        <p:nvSpPr>
+          <p:cNvPr id="5" name="Text Placeholder 4"/>
+          <p:cNvSpPr>
+            <a:spLocks noGrp="1"/>
+          </p:cNvSpPr>
+          <p:nvPr>
+            <p:ph type="body" sz="half" idx="3"/>
+          </p:nvPr>
+        </p:nvSpPr>
+        <p:spPr/>
+        <p:txBody>
+          <a:bodyPr/>
+          <a:lstStyle/>
+          <a:p>
+            <a:r>
+              <a:rPr lang="en-US" dirty="0" smtClean="0"/>
+              <a:t>Did Not Get In</a:t>
+            </a:r>
+            <a:endParaRPr lang="en-US" dirty="0"/>
+          </a:p>
+        </p:txBody>
+      </p:sp>
+      <p:sp>
+        <p:nvSpPr>
           <p:cNvPr id="3" name="Content Placeholder 2"/>
           <p:cNvSpPr>
             <a:spLocks noGrp="1"/>
           </p:cNvSpPr>
           <p:nvPr>
-            <p:ph idx="1"/>
-          </p:nvPr>
-        </p:nvSpPr>
-        <p:spPr/>
-        <p:txBody>
-          <a:bodyPr/>
-          <a:lstStyle/>
-          <a:p>
-            <a:r>
-              <a:rPr lang="en-US" dirty="0" smtClean="0"/>
-              <a:t>What we did get in</a:t>
-            </a:r>
-          </a:p>
-          <a:p>
-            <a:pPr lvl="1"/>
-            <a:r>
-              <a:rPr lang="en-US" dirty="0" smtClean="0"/>
-              <a:t>Large World, dynamic Enemies, Genre-specific entertaining </a:t>
+            <p:ph sz="quarter" idx="2"/>
+          </p:nvPr>
+        </p:nvSpPr>
+        <p:spPr/>
+        <p:txBody>
+          <a:bodyPr>
+            <a:normAutofit/>
+          </a:bodyPr>
+          <a:lstStyle/>
+          <a:p>
+            <a:r>
+              <a:rPr lang="en-US" dirty="0" smtClean="0"/>
+              <a:t>Large World</a:t>
+            </a:r>
+          </a:p>
+          <a:p>
+            <a:pPr>
+              <a:buNone/>
+            </a:pPr>
+            <a:endParaRPr lang="en-US" dirty="0" smtClean="0"/>
+          </a:p>
+          <a:p>
+            <a:r>
+              <a:rPr lang="en-US" dirty="0" smtClean="0"/>
+              <a:t>D</a:t>
+            </a:r>
+            <a:r>
+              <a:rPr lang="en-US" dirty="0" smtClean="0"/>
+              <a:t>ynamic Enemies</a:t>
+            </a:r>
+          </a:p>
+          <a:p>
+            <a:endParaRPr lang="en-US" dirty="0" smtClean="0"/>
+          </a:p>
+          <a:p>
+            <a:r>
+              <a:rPr lang="en-US" dirty="0" smtClean="0"/>
+              <a:t>Genre-specific Entertaining </a:t>
             </a:r>
             <a:r>
               <a:rPr lang="en-US" dirty="0" err="1" smtClean="0"/>
-              <a:t>gameplay</a:t>
-            </a:r>
-            <a:r>
-              <a:rPr lang="en-US" dirty="0" smtClean="0"/>
-              <a:t>, All single-player skills.</a:t>
-            </a:r>
-          </a:p>
-          <a:p>
-            <a:r>
-              <a:rPr lang="en-US" dirty="0" smtClean="0"/>
-              <a:t>What didn’t get in</a:t>
-            </a:r>
-          </a:p>
-          <a:p>
-            <a:pPr lvl="1"/>
-            <a:r>
-              <a:rPr lang="en-US" dirty="0" smtClean="0"/>
-              <a:t>Multiplayer, Magical Combos, Shops, Different quality of Skills, Original ideas of skills, better AI, extra Worlds</a:t>
+              <a:t>G</a:t>
+            </a:r>
+            <a:r>
+              <a:rPr lang="en-US" dirty="0" err="1" smtClean="0"/>
+              <a:t>ameplay</a:t>
+            </a:r>
+            <a:endParaRPr lang="en-US" dirty="0" smtClean="0"/>
+          </a:p>
+          <a:p>
+            <a:endParaRPr lang="en-US" dirty="0" smtClean="0"/>
+          </a:p>
+          <a:p>
+            <a:r>
+              <a:rPr lang="en-US" dirty="0" smtClean="0"/>
+              <a:t>All Single-Player </a:t>
+            </a:r>
+            <a:r>
+              <a:rPr lang="en-US" dirty="0" smtClean="0"/>
+              <a:t>S</a:t>
+            </a:r>
+            <a:r>
+              <a:rPr lang="en-US" dirty="0" smtClean="0"/>
+              <a:t>kills</a:t>
+            </a:r>
+          </a:p>
+        </p:txBody>
+      </p:sp>
+      <p:sp>
+        <p:nvSpPr>
+          <p:cNvPr id="6" name="Content Placeholder 5"/>
+          <p:cNvSpPr>
+            <a:spLocks noGrp="1"/>
+          </p:cNvSpPr>
+          <p:nvPr>
+            <p:ph sz="quarter" idx="4"/>
+          </p:nvPr>
+        </p:nvSpPr>
+        <p:spPr/>
+        <p:txBody>
+          <a:bodyPr>
+            <a:normAutofit/>
+          </a:bodyPr>
+          <a:lstStyle/>
+          <a:p>
+            <a:r>
+              <a:rPr lang="en-US" dirty="0" smtClean="0"/>
+              <a:t>Multiplayer</a:t>
+            </a:r>
+          </a:p>
+          <a:p>
+            <a:r>
+              <a:rPr lang="en-US" dirty="0" smtClean="0"/>
+              <a:t>Magic Combos</a:t>
+            </a:r>
+          </a:p>
+          <a:p>
+            <a:r>
+              <a:rPr lang="en-US" dirty="0" smtClean="0"/>
+              <a:t>Shops</a:t>
+            </a:r>
+          </a:p>
+          <a:p>
+            <a:r>
+              <a:rPr lang="en-US" dirty="0" smtClean="0"/>
+              <a:t>Different Quality of Skills</a:t>
+            </a:r>
+          </a:p>
+          <a:p>
+            <a:r>
+              <a:rPr lang="en-US" dirty="0" smtClean="0"/>
+              <a:t>Original Ideas of skills</a:t>
+            </a:r>
+          </a:p>
+          <a:p>
+            <a:r>
+              <a:rPr lang="en-US" dirty="0" smtClean="0"/>
+              <a:t>Better AI</a:t>
+            </a:r>
+          </a:p>
+          <a:p>
+            <a:r>
+              <a:rPr lang="en-US" dirty="0" smtClean="0"/>
+              <a:t>Extra Worlds</a:t>
             </a:r>
           </a:p>
         </p:txBody>
@@ -6025,6 +6205,13 @@
   <p:clrMapOvr>
     <a:masterClrMapping/>
   </p:clrMapOvr>
+  <p:timing>
+    <p:tnLst>
+      <p:par>
+        <p:cTn id="1" dur="indefinite" restart="never" nodeType="tmRoot"/>
+      </p:par>
+    </p:tnLst>
+  </p:timing>
 </p:sld>
 </file>
 
@@ -6080,30 +6267,57 @@
         </p:nvSpPr>
         <p:spPr/>
         <p:txBody>
-          <a:bodyPr/>
-          <a:lstStyle/>
-          <a:p>
-            <a:r>
-              <a:rPr lang="en-US" dirty="0" smtClean="0"/>
-              <a:t>Get the Three remaining Worlds in</a:t>
-            </a:r>
-          </a:p>
-          <a:p>
-            <a:r>
-              <a:rPr lang="en-US" dirty="0" smtClean="0"/>
-              <a:t>Multiplayer in and functioning</a:t>
-            </a:r>
-          </a:p>
-          <a:p>
-            <a:r>
-              <a:rPr lang="en-US" dirty="0" smtClean="0"/>
-              <a:t>Better character art</a:t>
-            </a:r>
-          </a:p>
-          <a:p>
-            <a:r>
-              <a:rPr lang="en-US" dirty="0" smtClean="0"/>
-              <a:t>BALANCE!!!!!</a:t>
+          <a:bodyPr>
+            <a:normAutofit/>
+          </a:bodyPr>
+          <a:lstStyle/>
+          <a:p>
+            <a:r>
+              <a:rPr lang="en-US" dirty="0" smtClean="0"/>
+              <a:t>Get in </a:t>
+            </a:r>
+            <a:r>
+              <a:rPr lang="en-US" dirty="0" smtClean="0"/>
+              <a:t>Three </a:t>
+            </a:r>
+            <a:r>
+              <a:rPr lang="en-US" dirty="0" smtClean="0"/>
+              <a:t>Remaining Worlds</a:t>
+            </a:r>
+          </a:p>
+          <a:p>
+            <a:endParaRPr lang="en-US" dirty="0" smtClean="0"/>
+          </a:p>
+          <a:p>
+            <a:r>
+              <a:rPr lang="en-US" dirty="0" smtClean="0"/>
+              <a:t>Functioning Multiplayer</a:t>
+            </a:r>
+          </a:p>
+          <a:p>
+            <a:endParaRPr lang="en-US" dirty="0" smtClean="0"/>
+          </a:p>
+          <a:p>
+            <a:r>
+              <a:rPr lang="en-US" dirty="0" smtClean="0"/>
+              <a:t>Better </a:t>
+            </a:r>
+            <a:r>
+              <a:rPr lang="en-US" dirty="0" smtClean="0"/>
+              <a:t>Character Art</a:t>
+            </a:r>
+          </a:p>
+          <a:p>
+            <a:endParaRPr lang="en-US" dirty="0" smtClean="0"/>
+          </a:p>
+          <a:p>
+            <a:r>
+              <a:rPr lang="en-US" dirty="0" smtClean="0"/>
+              <a:t>BALANCE</a:t>
+            </a:r>
+            <a:r>
+              <a:rPr lang="en-US" dirty="0" smtClean="0"/>
+              <a:t>!!!!!</a:t>
             </a:r>
           </a:p>
         </p:txBody>
@@ -6113,6 +6327,13 @@
   <p:clrMapOvr>
     <a:masterClrMapping/>
   </p:clrMapOvr>
+  <p:timing>
+    <p:tnLst>
+      <p:par>
+        <p:cTn id="1" dur="indefinite" restart="never" nodeType="tmRoot"/>
+      </p:par>
+    </p:tnLst>
+  </p:timing>
 </p:sld>
 </file>
 
@@ -6148,7 +6369,6 @@
           <a:bodyPr/>
           <a:lstStyle/>
           <a:p>
-            <a:pPr algn="ctr"/>
             <a:r>
               <a:rPr lang="en-US" dirty="0" smtClean="0"/>
               <a:t>Demo and Questions</a:t>
@@ -6169,49 +6389,53 @@
         </p:nvSpPr>
         <p:spPr/>
         <p:txBody>
-          <a:bodyPr/>
-          <a:lstStyle/>
-          <a:p>
-            <a:pPr>
+          <a:bodyPr>
+            <a:normAutofit/>
+          </a:bodyPr>
+          <a:lstStyle/>
+          <a:p>
+            <a:pPr algn="ctr">
               <a:buNone/>
             </a:pPr>
             <a:r>
               <a:rPr lang="en-US" dirty="0" smtClean="0"/>
-              <a:t>	</a:t>
-            </a:r>
-            <a:r>
-              <a:rPr lang="en-US" dirty="0" smtClean="0"/>
-              <a:t>			  EST</a:t>
-            </a:r>
-          </a:p>
-          <a:p>
-            <a:pPr>
+              <a:t>EST</a:t>
+            </a:r>
+            <a:endParaRPr lang="en-US" dirty="0" smtClean="0"/>
+          </a:p>
+          <a:p>
+            <a:pPr algn="ctr">
               <a:buNone/>
             </a:pPr>
             <a:r>
               <a:rPr lang="en-US" dirty="0" smtClean="0"/>
+              <a:t>U</a:t>
+            </a:r>
+            <a:r>
+              <a:rPr lang="en-US" dirty="0" smtClean="0"/>
               <a:t>	</a:t>
             </a:r>
             <a:r>
               <a:rPr lang="en-US" dirty="0" smtClean="0"/>
-              <a:t>		        U        I</a:t>
-            </a:r>
-          </a:p>
-          <a:p>
-            <a:pPr>
+              <a:t>		</a:t>
+            </a:r>
+            <a:r>
+              <a:rPr lang="en-US" dirty="0" smtClean="0"/>
+              <a:t>I</a:t>
+            </a:r>
+            <a:endParaRPr lang="en-US" dirty="0" smtClean="0"/>
+          </a:p>
+          <a:p>
+            <a:pPr algn="ctr">
               <a:buNone/>
             </a:pPr>
             <a:r>
               <a:rPr lang="en-US" dirty="0" smtClean="0"/>
-              <a:t> </a:t>
-            </a:r>
-            <a:r>
-              <a:rPr lang="en-US" dirty="0" smtClean="0"/>
-              <a:t>                      Q	  O</a:t>
-            </a:r>
-          </a:p>
-          <a:p>
-            <a:pPr>
+              <a:t>Q			O</a:t>
+            </a:r>
+          </a:p>
+          <a:p>
+            <a:pPr algn="ctr">
               <a:buNone/>
             </a:pPr>
             <a:r>
@@ -6220,46 +6444,45 @@
             </a:r>
             <a:r>
               <a:rPr lang="en-US" dirty="0" smtClean="0"/>
-              <a:t>				N</a:t>
-            </a:r>
-          </a:p>
-          <a:p>
-            <a:pPr>
+              <a:t>	</a:t>
+            </a:r>
+            <a:r>
+              <a:rPr lang="en-US" dirty="0" smtClean="0"/>
+              <a:t>N</a:t>
+            </a:r>
+          </a:p>
+          <a:p>
+            <a:pPr algn="ctr">
               <a:buNone/>
             </a:pPr>
             <a:r>
               <a:rPr lang="en-US" dirty="0" smtClean="0"/>
-              <a:t>	</a:t>
-            </a:r>
-            <a:r>
-              <a:rPr lang="en-US" dirty="0" smtClean="0"/>
-              <a:t>			     M</a:t>
-            </a:r>
-          </a:p>
-          <a:p>
-            <a:pPr>
+              <a:t>	M</a:t>
+            </a:r>
+          </a:p>
+          <a:p>
+            <a:pPr algn="ctr">
               <a:buNone/>
             </a:pPr>
             <a:r>
               <a:rPr lang="en-US" dirty="0" smtClean="0"/>
-              <a:t>				     A</a:t>
-            </a:r>
-          </a:p>
-          <a:p>
-            <a:pPr>
+              <a:t>A</a:t>
+            </a:r>
+          </a:p>
+          <a:p>
+            <a:pPr algn="ctr">
               <a:buNone/>
             </a:pPr>
             <a:endParaRPr lang="en-US" dirty="0" smtClean="0"/>
           </a:p>
           <a:p>
-            <a:pPr>
+            <a:pPr algn="ctr">
               <a:buNone/>
             </a:pPr>
             <a:r>
               <a:rPr lang="en-US" dirty="0" smtClean="0"/>
-              <a:t>				    RK</a:t>
-            </a:r>
-            <a:endParaRPr lang="en-US" dirty="0" smtClean="0"/>
+              <a:t>RK</a:t>
+            </a:r>
           </a:p>
         </p:txBody>
       </p:sp>
@@ -6311,65 +6534,249 @@
           </a:p>
         </p:txBody>
       </p:sp>
-      <p:sp>
-        <p:nvSpPr>
-          <p:cNvPr id="3" name="Content Placeholder 2"/>
-          <p:cNvSpPr>
-            <a:spLocks noGrp="1"/>
-          </p:cNvSpPr>
+      <p:graphicFrame>
+        <p:nvGraphicFramePr>
+          <p:cNvPr id="5" name="Content Placeholder 4"/>
+          <p:cNvGraphicFramePr>
+            <a:graphicFrameLocks noGrp="1"/>
+          </p:cNvGraphicFramePr>
           <p:nvPr>
             <p:ph idx="1"/>
           </p:nvPr>
-        </p:nvSpPr>
-        <p:spPr/>
-        <p:txBody>
-          <a:bodyPr/>
-          <a:lstStyle/>
-          <a:p>
-            <a:r>
-              <a:rPr lang="en-US" dirty="0" smtClean="0"/>
-              <a:t>Alex Beerman : </a:t>
-            </a:r>
-            <a:r>
-              <a:rPr lang="en-US" sz="2400" dirty="0" smtClean="0"/>
-              <a:t>Lead Designer/Art Design/World Designer</a:t>
-            </a:r>
-          </a:p>
-          <a:p>
-            <a:r>
-              <a:rPr lang="en-US" dirty="0" smtClean="0"/>
-              <a:t>John Parks : </a:t>
-            </a:r>
-            <a:r>
-              <a:rPr lang="en-US" sz="2400" dirty="0" smtClean="0"/>
-              <a:t>Lead Programmer/Artist/Combat</a:t>
-            </a:r>
-            <a:endParaRPr lang="en-US" dirty="0" smtClean="0"/>
-          </a:p>
-          <a:p>
-            <a:r>
-              <a:rPr lang="en-US" dirty="0" smtClean="0"/>
-              <a:t>Matt Morrill : </a:t>
-            </a:r>
-            <a:r>
-              <a:rPr lang="en-US" sz="2400" dirty="0" smtClean="0"/>
-              <a:t>Project Manager/Co-designer</a:t>
-            </a:r>
-            <a:endParaRPr lang="en-US" dirty="0" smtClean="0"/>
-          </a:p>
-          <a:p>
-            <a:r>
-              <a:rPr lang="en-US" dirty="0" smtClean="0"/>
-              <a:t>Joe Ortega : </a:t>
-            </a:r>
-            <a:r>
-              <a:rPr lang="en-US" sz="2400" dirty="0" smtClean="0"/>
-              <a:t>Experience System</a:t>
-            </a:r>
-            <a:endParaRPr lang="en-US" dirty="0"/>
-          </a:p>
-        </p:txBody>
-      </p:sp>
+        </p:nvGraphicFramePr>
+        <p:xfrm>
+          <a:off x="838200" y="2085340"/>
+          <a:ext cx="7467600" cy="2443480"/>
+        </p:xfrm>
+        <a:graphic>
+          <a:graphicData uri="http://schemas.openxmlformats.org/drawingml/2006/table">
+            <a:tbl>
+              <a:tblPr firstRow="1" bandRow="1">
+                <a:tableStyleId>{5C22544A-7EE6-4342-B048-85BDC9FD1C3A}</a:tableStyleId>
+              </a:tblPr>
+              <a:tblGrid>
+                <a:gridCol w="2895600"/>
+                <a:gridCol w="4572000"/>
+              </a:tblGrid>
+              <a:tr h="370840">
+                <a:tc>
+                  <a:txBody>
+                    <a:bodyPr/>
+                    <a:lstStyle/>
+                    <a:p>
+                      <a:r>
+                        <a:rPr lang="en-US" dirty="0" smtClean="0"/>
+                        <a:t>Group Member</a:t>
+                      </a:r>
+                      <a:endParaRPr lang="en-US" dirty="0"/>
+                    </a:p>
+                  </a:txBody>
+                  <a:tcPr/>
+                </a:tc>
+                <a:tc>
+                  <a:txBody>
+                    <a:bodyPr/>
+                    <a:lstStyle/>
+                    <a:p>
+                      <a:r>
+                        <a:rPr lang="en-US" baseline="0" dirty="0" smtClean="0"/>
+                        <a:t>Role(s) and Responsibilities</a:t>
+                      </a:r>
+                      <a:endParaRPr lang="en-US" dirty="0"/>
+                    </a:p>
+                  </a:txBody>
+                  <a:tcPr/>
+                </a:tc>
+              </a:tr>
+              <a:tr h="370840">
+                <a:tc>
+                  <a:txBody>
+                    <a:bodyPr/>
+                    <a:lstStyle/>
+                    <a:p>
+                      <a:pPr algn="l"/>
+                      <a:r>
+                        <a:rPr lang="en-US" sz="2800" dirty="0" smtClean="0"/>
+                        <a:t>Alex </a:t>
+                      </a:r>
+                      <a:r>
+                        <a:rPr lang="en-US" sz="2800" dirty="0" err="1" smtClean="0"/>
+                        <a:t>Beerman</a:t>
+                      </a:r>
+                      <a:endParaRPr lang="en-US" sz="2800" dirty="0"/>
+                    </a:p>
+                  </a:txBody>
+                  <a:tcPr/>
+                </a:tc>
+                <a:tc>
+                  <a:txBody>
+                    <a:bodyPr/>
+                    <a:lstStyle/>
+                    <a:p>
+                      <a:r>
+                        <a:rPr lang="en-US" sz="1800" dirty="0" smtClean="0"/>
+                        <a:t>Lead </a:t>
+                      </a:r>
+                      <a:r>
+                        <a:rPr lang="en-US" sz="1800" dirty="0" smtClean="0"/>
+                        <a:t>Designer, Art Design, World </a:t>
+                      </a:r>
+                      <a:r>
+                        <a:rPr lang="en-US" sz="1800" dirty="0" smtClean="0"/>
+                        <a:t>Designer</a:t>
+                      </a:r>
+                      <a:endParaRPr lang="en-US" dirty="0"/>
+                    </a:p>
+                  </a:txBody>
+                  <a:tcPr/>
+                </a:tc>
+              </a:tr>
+              <a:tr h="370840">
+                <a:tc>
+                  <a:txBody>
+                    <a:bodyPr/>
+                    <a:lstStyle/>
+                    <a:p>
+                      <a:pPr algn="l"/>
+                      <a:r>
+                        <a:rPr lang="en-US" sz="2800" dirty="0" smtClean="0"/>
+                        <a:t>Matthew Morrill</a:t>
+                      </a:r>
+                      <a:endParaRPr lang="en-US" sz="2800" dirty="0"/>
+                    </a:p>
+                  </a:txBody>
+                  <a:tcPr/>
+                </a:tc>
+                <a:tc>
+                  <a:txBody>
+                    <a:bodyPr/>
+                    <a:lstStyle/>
+                    <a:p>
+                      <a:pPr marL="0" marR="0" indent="0" algn="l" defTabSz="914400" rtl="0" eaLnBrk="1" fontAlgn="auto" latinLnBrk="0" hangingPunct="1">
+                        <a:lnSpc>
+                          <a:spcPct val="100000"/>
+                        </a:lnSpc>
+                        <a:spcBef>
+                          <a:spcPts val="0"/>
+                        </a:spcBef>
+                        <a:spcAft>
+                          <a:spcPts val="0"/>
+                        </a:spcAft>
+                        <a:buClrTx/>
+                        <a:buSzTx/>
+                        <a:buFontTx/>
+                        <a:buNone/>
+                        <a:tabLst/>
+                        <a:defRPr/>
+                      </a:pPr>
+                      <a:r>
+                        <a:rPr lang="en-US" sz="1800" dirty="0" smtClean="0"/>
+                        <a:t>Project Manager, Co-designer</a:t>
+                      </a:r>
+                      <a:endParaRPr lang="en-US" dirty="0" smtClean="0"/>
+                    </a:p>
+                  </a:txBody>
+                  <a:tcPr/>
+                </a:tc>
+              </a:tr>
+              <a:tr h="370840">
+                <a:tc>
+                  <a:txBody>
+                    <a:bodyPr/>
+                    <a:lstStyle/>
+                    <a:p>
+                      <a:pPr marL="0" marR="0" indent="0" algn="l" defTabSz="914400" rtl="0" eaLnBrk="1" fontAlgn="auto" latinLnBrk="0" hangingPunct="1">
+                        <a:lnSpc>
+                          <a:spcPct val="100000"/>
+                        </a:lnSpc>
+                        <a:spcBef>
+                          <a:spcPts val="0"/>
+                        </a:spcBef>
+                        <a:spcAft>
+                          <a:spcPts val="0"/>
+                        </a:spcAft>
+                        <a:buClrTx/>
+                        <a:buSzTx/>
+                        <a:buFontTx/>
+                        <a:buNone/>
+                        <a:tabLst/>
+                        <a:defRPr/>
+                      </a:pPr>
+                      <a:r>
+                        <a:rPr lang="en-US" sz="2800" dirty="0" smtClean="0"/>
+                        <a:t>John Parks</a:t>
+                      </a:r>
+                    </a:p>
+                  </a:txBody>
+                  <a:tcPr/>
+                </a:tc>
+                <a:tc>
+                  <a:txBody>
+                    <a:bodyPr/>
+                    <a:lstStyle/>
+                    <a:p>
+                      <a:pPr marL="0" marR="0" indent="0" algn="l" defTabSz="914400" rtl="0" eaLnBrk="1" fontAlgn="auto" latinLnBrk="0" hangingPunct="1">
+                        <a:lnSpc>
+                          <a:spcPct val="100000"/>
+                        </a:lnSpc>
+                        <a:spcBef>
+                          <a:spcPts val="0"/>
+                        </a:spcBef>
+                        <a:spcAft>
+                          <a:spcPts val="0"/>
+                        </a:spcAft>
+                        <a:buClrTx/>
+                        <a:buSzTx/>
+                        <a:buFontTx/>
+                        <a:buNone/>
+                        <a:tabLst/>
+                        <a:defRPr/>
+                      </a:pPr>
+                      <a:r>
+                        <a:rPr lang="en-US" sz="1800" dirty="0" smtClean="0"/>
+                        <a:t>Lead Programmer, Artist, Combat</a:t>
+                      </a:r>
+                      <a:endParaRPr lang="en-US" dirty="0" smtClean="0"/>
+                    </a:p>
+                  </a:txBody>
+                  <a:tcPr/>
+                </a:tc>
+              </a:tr>
+              <a:tr h="370840">
+                <a:tc>
+                  <a:txBody>
+                    <a:bodyPr/>
+                    <a:lstStyle/>
+                    <a:p>
+                      <a:pPr algn="l"/>
+                      <a:r>
+                        <a:rPr lang="en-US" sz="2800" dirty="0" smtClean="0"/>
+                        <a:t>Joe Ortega </a:t>
+                      </a:r>
+                      <a:endParaRPr lang="en-US" sz="2800" dirty="0"/>
+                    </a:p>
+                  </a:txBody>
+                  <a:tcPr/>
+                </a:tc>
+                <a:tc>
+                  <a:txBody>
+                    <a:bodyPr/>
+                    <a:lstStyle/>
+                    <a:p>
+                      <a:r>
+                        <a:rPr lang="en-US" sz="1800" dirty="0" smtClean="0"/>
+                        <a:t>Experience System</a:t>
+                      </a:r>
+                      <a:endParaRPr lang="en-US" dirty="0"/>
+                    </a:p>
+                  </a:txBody>
+                  <a:tcPr/>
+                </a:tc>
+              </a:tr>
+            </a:tbl>
+          </a:graphicData>
+        </a:graphic>
+      </p:graphicFrame>
     </p:spTree>
   </p:cSld>
   <p:clrMapOvr>
@@ -6420,7 +6827,11 @@
           <a:p>
             <a:r>
               <a:rPr lang="en-US" dirty="0" smtClean="0"/>
-              <a:t>Time Warrior: What it is</a:t>
+              <a:t>Time </a:t>
+            </a:r>
+            <a:r>
+              <a:rPr lang="en-US" dirty="0" smtClean="0"/>
+              <a:t>Warrior</a:t>
             </a:r>
             <a:endParaRPr lang="en-US" dirty="0"/>
           </a:p>
@@ -6443,19 +6854,35 @@
           <a:p>
             <a:r>
               <a:rPr lang="en-US" dirty="0" smtClean="0"/>
-              <a:t>2D Action RPG</a:t>
-            </a:r>
-          </a:p>
-          <a:p>
-            <a:r>
-              <a:rPr lang="en-US" dirty="0" smtClean="0"/>
-              <a:t>Homage to Zelda, Diablo, Elder Scrolls</a:t>
-            </a:r>
-          </a:p>
-          <a:p>
-            <a:r>
-              <a:rPr lang="en-US" dirty="0" smtClean="0"/>
-              <a:t>Fantasy Sci-fi</a:t>
+              <a:t>Homage </a:t>
+            </a:r>
+            <a:r>
+              <a:rPr lang="en-US" dirty="0" smtClean="0"/>
+              <a:t>to Zelda, Diablo, Elder </a:t>
+            </a:r>
+            <a:r>
+              <a:rPr lang="en-US" dirty="0" smtClean="0"/>
+              <a:t>Scrolls</a:t>
+            </a:r>
+          </a:p>
+          <a:p>
+            <a:r>
+              <a:rPr lang="en-US" dirty="0" smtClean="0"/>
+              <a:t>2D Action </a:t>
+            </a:r>
+            <a:r>
+              <a:rPr lang="en-US" dirty="0" smtClean="0"/>
+              <a:t>RPG</a:t>
+            </a:r>
+          </a:p>
+          <a:p>
+            <a:r>
+              <a:rPr lang="en-US" dirty="0" smtClean="0"/>
+              <a:t>Fantasy </a:t>
+            </a:r>
+            <a:r>
+              <a:rPr lang="en-US" dirty="0" smtClean="0"/>
+              <a:t>Sci-fi</a:t>
             </a:r>
             <a:endParaRPr lang="en-US" dirty="0"/>
           </a:p>
@@ -6478,7 +6905,7 @@
         </p:blipFill>
         <p:spPr>
           <a:xfrm>
-            <a:off x="4038600" y="2971800"/>
+            <a:off x="2505808" y="3276600"/>
             <a:ext cx="4132385" cy="3581400"/>
           </a:xfrm>
           <a:prstGeom prst="rect">
@@ -6491,6 +6918,13 @@
   <p:clrMapOvr>
     <a:masterClrMapping/>
   </p:clrMapOvr>
+  <p:timing>
+    <p:tnLst>
+      <p:par>
+        <p:cTn id="1" dur="indefinite" restart="never" nodeType="tmRoot"/>
+      </p:par>
+    </p:tnLst>
+  </p:timing>
 </p:sld>
 </file>
 
@@ -6551,19 +6985,24 @@
           <a:p>
             <a:r>
               <a:rPr lang="en-US" dirty="0" smtClean="0"/>
-              <a:t>Day/Night cycle based on system time</a:t>
-            </a:r>
-            <a:r>
-              <a:rPr lang="en-US" dirty="0" smtClean="0"/>
-              <a:t>.</a:t>
+              <a:t>Day/Night cycle based on system </a:t>
+            </a:r>
+            <a:r>
+              <a:rPr lang="en-US" dirty="0" smtClean="0"/>
+              <a:t>time</a:t>
             </a:r>
             <a:endParaRPr lang="en-US" dirty="0" smtClean="0"/>
           </a:p>
           <a:p>
             <a:r>
               <a:rPr lang="en-US" dirty="0" smtClean="0"/>
-              <a:t>Scripting Engine.</a:t>
-            </a:r>
+              <a:t>Scripting </a:t>
+            </a:r>
+            <a:r>
+              <a:rPr lang="en-US" dirty="0" smtClean="0"/>
+              <a:t>Engine</a:t>
+            </a:r>
+            <a:endParaRPr lang="en-US" dirty="0" smtClean="0"/>
           </a:p>
           <a:p>
             <a:r>
@@ -6600,11 +7039,7 @@
           <a:p>
             <a:r>
               <a:rPr lang="en-US" dirty="0" smtClean="0"/>
-              <a:t>Randomly picked </a:t>
-            </a:r>
-            <a:r>
-              <a:rPr lang="en-US" dirty="0" smtClean="0"/>
-              <a:t>dungeons</a:t>
+              <a:t>Randomly picked dungeons</a:t>
             </a:r>
           </a:p>
           <a:p>
@@ -6674,33 +7109,74 @@
       </p:sp>
       <p:sp>
         <p:nvSpPr>
+          <p:cNvPr id="5" name="Text Placeholder 4"/>
+          <p:cNvSpPr>
+            <a:spLocks noGrp="1"/>
+          </p:cNvSpPr>
+          <p:nvPr>
+            <p:ph type="body" idx="1"/>
+          </p:nvPr>
+        </p:nvSpPr>
+        <p:spPr/>
+        <p:txBody>
+          <a:bodyPr/>
+          <a:lstStyle/>
+          <a:p>
+            <a:r>
+              <a:rPr lang="en-US" dirty="0" smtClean="0"/>
+              <a:t>Positives</a:t>
+            </a:r>
+            <a:endParaRPr lang="en-US" dirty="0"/>
+          </a:p>
+        </p:txBody>
+      </p:sp>
+      <p:sp>
+        <p:nvSpPr>
+          <p:cNvPr id="6" name="Text Placeholder 5"/>
+          <p:cNvSpPr>
+            <a:spLocks noGrp="1"/>
+          </p:cNvSpPr>
+          <p:nvPr>
+            <p:ph type="body" sz="half" idx="3"/>
+          </p:nvPr>
+        </p:nvSpPr>
+        <p:spPr/>
+        <p:txBody>
+          <a:bodyPr/>
+          <a:lstStyle/>
+          <a:p>
+            <a:r>
+              <a:rPr lang="en-US" dirty="0" smtClean="0"/>
+              <a:t>Negatives</a:t>
+            </a:r>
+            <a:endParaRPr lang="en-US" dirty="0"/>
+          </a:p>
+        </p:txBody>
+      </p:sp>
+      <p:sp>
+        <p:nvSpPr>
           <p:cNvPr id="26" name="Content Placeholder 25"/>
           <p:cNvSpPr>
             <a:spLocks noGrp="1"/>
           </p:cNvSpPr>
           <p:nvPr>
-            <p:ph sz="half" idx="1"/>
-          </p:nvPr>
-        </p:nvSpPr>
-        <p:spPr/>
-        <p:txBody>
-          <a:bodyPr/>
-          <a:lstStyle/>
-          <a:p>
-            <a:r>
-              <a:rPr lang="en-US" dirty="0" smtClean="0"/>
-              <a:t>Positives</a:t>
+            <p:ph sz="quarter" idx="2"/>
+          </p:nvPr>
+        </p:nvSpPr>
+        <p:spPr/>
+        <p:txBody>
+          <a:bodyPr>
+            <a:normAutofit/>
+          </a:bodyPr>
+          <a:lstStyle/>
+          <a:p>
+            <a:r>
+              <a:rPr lang="en-US" dirty="0" smtClean="0"/>
+              <a:t>Good Communication</a:t>
             </a:r>
           </a:p>
           <a:p>
             <a:pPr lvl="1"/>
-            <a:r>
-              <a:rPr lang="en-US" dirty="0" smtClean="0"/>
-              <a:t>Good communication</a:t>
-            </a:r>
-          </a:p>
-          <a:p>
-            <a:pPr lvl="2"/>
             <a:r>
               <a:rPr lang="en-US" dirty="0" err="1" smtClean="0"/>
               <a:t>Facebook</a:t>
@@ -6708,43 +7184,55 @@
             <a:endParaRPr lang="en-US" dirty="0" smtClean="0"/>
           </a:p>
           <a:p>
-            <a:pPr lvl="2"/>
-            <a:r>
-              <a:rPr lang="en-US" dirty="0" smtClean="0"/>
-              <a:t>Commit notes</a:t>
-            </a:r>
-          </a:p>
-          <a:p>
-            <a:pPr lvl="2"/>
-            <a:r>
-              <a:rPr lang="en-US" dirty="0" smtClean="0"/>
-              <a:t>Face to </a:t>
-            </a:r>
-            <a:r>
-              <a:rPr lang="en-US" dirty="0" smtClean="0"/>
-              <a:t>face</a:t>
-            </a:r>
-          </a:p>
-          <a:p>
             <a:pPr lvl="1"/>
             <a:r>
               <a:rPr lang="en-US" dirty="0" smtClean="0"/>
-              <a:t>No conflicts</a:t>
+              <a:t>Commit Notes</a:t>
             </a:r>
           </a:p>
           <a:p>
             <a:pPr lvl="1"/>
             <a:r>
               <a:rPr lang="en-US" dirty="0" smtClean="0"/>
-              <a:t>Code meshed well</a:t>
-            </a:r>
-          </a:p>
-          <a:p>
-            <a:pPr lvl="1"/>
-            <a:r>
-              <a:rPr lang="en-US" dirty="0" smtClean="0"/>
-              <a:t>Skill levels matched</a:t>
-            </a:r>
+              <a:t>Face to Face</a:t>
+            </a:r>
+          </a:p>
+          <a:p>
+            <a:r>
+              <a:rPr lang="en-US" dirty="0" smtClean="0"/>
+              <a:t>No Conflicts</a:t>
+            </a:r>
+          </a:p>
+          <a:p>
+            <a:endParaRPr lang="en-US" dirty="0" smtClean="0"/>
+          </a:p>
+          <a:p>
+            <a:r>
+              <a:rPr lang="en-US" dirty="0" smtClean="0"/>
+              <a:t>Code </a:t>
+            </a:r>
+            <a:r>
+              <a:rPr lang="en-US" dirty="0" smtClean="0"/>
+              <a:t>Meshed Well</a:t>
+            </a:r>
+          </a:p>
+          <a:p>
+            <a:endParaRPr lang="en-US" dirty="0" smtClean="0"/>
+          </a:p>
+          <a:p>
+            <a:r>
+              <a:rPr lang="en-US" dirty="0" smtClean="0"/>
+              <a:t>Skill </a:t>
+            </a:r>
+            <a:r>
+              <a:rPr lang="en-US" dirty="0" smtClean="0"/>
+              <a:t>L</a:t>
+            </a:r>
+            <a:r>
+              <a:rPr lang="en-US" dirty="0" smtClean="0"/>
+              <a:t>evels Matched</a:t>
+            </a:r>
+            <a:endParaRPr lang="en-US" dirty="0" smtClean="0"/>
           </a:p>
           <a:p>
             <a:pPr lvl="1"/>
@@ -6759,60 +7247,76 @@
             <a:spLocks noGrp="1"/>
           </p:cNvSpPr>
           <p:nvPr>
-            <p:ph sz="half" idx="2"/>
-          </p:nvPr>
-        </p:nvSpPr>
-        <p:spPr/>
-        <p:txBody>
-          <a:bodyPr/>
-          <a:lstStyle/>
-          <a:p>
-            <a:r>
-              <a:rPr lang="en-US" dirty="0" smtClean="0"/>
-              <a:t>Negatives</a:t>
+            <p:ph sz="quarter" idx="4"/>
+          </p:nvPr>
+        </p:nvSpPr>
+        <p:spPr/>
+        <p:txBody>
+          <a:bodyPr>
+            <a:normAutofit/>
+          </a:bodyPr>
+          <a:lstStyle/>
+          <a:p>
+            <a:r>
+              <a:rPr lang="en-US" dirty="0" smtClean="0"/>
+              <a:t>Original 4th Member Left</a:t>
+            </a:r>
+          </a:p>
+          <a:p>
+            <a:endParaRPr lang="en-US" dirty="0" smtClean="0"/>
+          </a:p>
+          <a:p>
+            <a:r>
+              <a:rPr lang="en-US" dirty="0" smtClean="0"/>
+              <a:t>Code </a:t>
+            </a:r>
+            <a:r>
+              <a:rPr lang="en-US" dirty="0" smtClean="0"/>
+              <a:t>Modified without Asking</a:t>
+            </a:r>
+          </a:p>
+          <a:p>
+            <a:endParaRPr lang="en-US" dirty="0" smtClean="0"/>
+          </a:p>
+          <a:p>
+            <a:r>
+              <a:rPr lang="en-US" dirty="0" smtClean="0"/>
+              <a:t>Living Locations</a:t>
             </a:r>
           </a:p>
           <a:p>
             <a:pPr lvl="1"/>
             <a:r>
               <a:rPr lang="en-US" dirty="0" smtClean="0"/>
-              <a:t>Original fourth member left</a:t>
+              <a:t>Alex in San </a:t>
+            </a:r>
+            <a:r>
+              <a:rPr lang="en-US" dirty="0" smtClean="0"/>
+              <a:t>Mateo</a:t>
             </a:r>
           </a:p>
           <a:p>
             <a:pPr lvl="1"/>
             <a:r>
               <a:rPr lang="en-US" dirty="0" smtClean="0"/>
-              <a:t>Code modified w/o asking</a:t>
+              <a:t>Matt in Fremont</a:t>
             </a:r>
           </a:p>
           <a:p>
             <a:pPr lvl="1"/>
             <a:r>
               <a:rPr lang="en-US" dirty="0" smtClean="0"/>
-              <a:t>Living locations</a:t>
-            </a:r>
-          </a:p>
-          <a:p>
-            <a:pPr lvl="2"/>
-            <a:r>
-              <a:rPr lang="en-US" dirty="0" smtClean="0"/>
-              <a:t>John is San Jose</a:t>
-            </a:r>
-          </a:p>
-          <a:p>
-            <a:pPr lvl="2"/>
-            <a:r>
-              <a:rPr lang="en-US" dirty="0" smtClean="0"/>
-              <a:t>Alex in San Mateo</a:t>
-            </a:r>
-          </a:p>
-          <a:p>
-            <a:pPr lvl="2"/>
-            <a:r>
-              <a:rPr lang="en-US" dirty="0" smtClean="0"/>
-              <a:t>Matt in Fremont</a:t>
-            </a:r>
+              <a:t>John in </a:t>
+            </a:r>
+            <a:r>
+              <a:rPr lang="en-US" dirty="0" smtClean="0"/>
+              <a:t>San </a:t>
+            </a:r>
+            <a:r>
+              <a:rPr lang="en-US" dirty="0" smtClean="0"/>
+              <a:t>Jose</a:t>
+            </a:r>
+            <a:endParaRPr lang="en-US" dirty="0" smtClean="0"/>
           </a:p>
         </p:txBody>
       </p:sp>
@@ -6889,8 +7393,13 @@
           <a:p>
             <a:r>
               <a:rPr lang="en-US" dirty="0" smtClean="0"/>
-              <a:t>Largely complex ideas</a:t>
-            </a:r>
+              <a:t>Largely </a:t>
+            </a:r>
+            <a:r>
+              <a:rPr lang="en-US" dirty="0" smtClean="0"/>
+              <a:t>Complex Ideas</a:t>
+            </a:r>
+            <a:endParaRPr lang="en-US" dirty="0" smtClean="0"/>
           </a:p>
           <a:p>
             <a:r>
@@ -6901,41 +7410,74 @@
           <a:p>
             <a:r>
               <a:rPr lang="en-US" dirty="0" smtClean="0"/>
-              <a:t>Computer issues</a:t>
-            </a:r>
-          </a:p>
-          <a:p>
-            <a:r>
-              <a:rPr lang="en-US" dirty="0" smtClean="0"/>
-              <a:t>Low networking knowledge</a:t>
-            </a:r>
-          </a:p>
-          <a:p>
-            <a:r>
-              <a:rPr lang="en-US" dirty="0" smtClean="0"/>
-              <a:t>No dedicated artist</a:t>
-            </a:r>
-          </a:p>
-          <a:p>
-            <a:r>
-              <a:rPr lang="en-US" dirty="0" smtClean="0"/>
-              <a:t>Hard delegation of tasks</a:t>
-            </a:r>
-          </a:p>
-          <a:p>
-            <a:r>
-              <a:rPr lang="en-US" dirty="0" smtClean="0"/>
-              <a:t>Deadlines missed</a:t>
-            </a:r>
-          </a:p>
-          <a:p>
-            <a:r>
-              <a:rPr lang="en-US" dirty="0" smtClean="0"/>
-              <a:t>Team Size = {</a:t>
-            </a:r>
-            <a:r>
-              <a:rPr lang="en-US" dirty="0" smtClean="0"/>
-              <a:t>4,3,2,1.5,4,2,3,2,3}</a:t>
+              <a:t>Computer </a:t>
+            </a:r>
+            <a:r>
+              <a:rPr lang="en-US" dirty="0" smtClean="0"/>
+              <a:t>Issues</a:t>
+            </a:r>
+            <a:endParaRPr lang="en-US" dirty="0" smtClean="0"/>
+          </a:p>
+          <a:p>
+            <a:r>
+              <a:rPr lang="en-US" dirty="0" smtClean="0"/>
+              <a:t>Low </a:t>
+            </a:r>
+            <a:r>
+              <a:rPr lang="en-US" dirty="0" smtClean="0"/>
+              <a:t>Networking Knowledge</a:t>
+            </a:r>
+            <a:endParaRPr lang="en-US" dirty="0" smtClean="0"/>
+          </a:p>
+          <a:p>
+            <a:r>
+              <a:rPr lang="en-US" dirty="0" smtClean="0"/>
+              <a:t>No </a:t>
+            </a:r>
+            <a:r>
+              <a:rPr lang="en-US" dirty="0" smtClean="0"/>
+              <a:t>D</a:t>
+            </a:r>
+            <a:r>
+              <a:rPr lang="en-US" dirty="0" smtClean="0"/>
+              <a:t>edicated Artist</a:t>
+            </a:r>
+            <a:endParaRPr lang="en-US" dirty="0" smtClean="0"/>
+          </a:p>
+          <a:p>
+            <a:r>
+              <a:rPr lang="en-US" dirty="0" smtClean="0"/>
+              <a:t>Hard </a:t>
+            </a:r>
+            <a:r>
+              <a:rPr lang="en-US" dirty="0" smtClean="0"/>
+              <a:t>Delegation </a:t>
+            </a:r>
+            <a:r>
+              <a:rPr lang="en-US" dirty="0" smtClean="0"/>
+              <a:t>of </a:t>
+            </a:r>
+            <a:r>
+              <a:rPr lang="en-US" dirty="0" smtClean="0"/>
+              <a:t>Tasks</a:t>
+            </a:r>
+            <a:endParaRPr lang="en-US" dirty="0" smtClean="0"/>
+          </a:p>
+          <a:p>
+            <a:r>
+              <a:rPr lang="en-US" dirty="0" smtClean="0"/>
+              <a:t>Deadlines </a:t>
+            </a:r>
+            <a:r>
+              <a:rPr lang="en-US" dirty="0" smtClean="0"/>
+              <a:t>Missed</a:t>
+            </a:r>
+            <a:endParaRPr lang="en-US" dirty="0" smtClean="0"/>
+          </a:p>
+          <a:p>
+            <a:r>
+              <a:rPr lang="en-US" dirty="0" smtClean="0"/>
+              <a:t>Team Size = {4,3,2,1.5,4,2,3,2,3}</a:t>
             </a:r>
             <a:endParaRPr lang="en-US" dirty="0"/>
           </a:p>
@@ -6957,7 +7499,7 @@
         </p:blipFill>
         <p:spPr>
           <a:xfrm>
-            <a:off x="5638800" y="152400"/>
+            <a:off x="5895974" y="0"/>
             <a:ext cx="3248026" cy="3352800"/>
           </a:xfrm>
           <a:prstGeom prst="rect">
@@ -7094,7 +7636,7 @@
           <a:p>
             <a:r>
               <a:rPr lang="en-US" dirty="0" smtClean="0"/>
-              <a:t>John Parks</a:t>
+              <a:t>Matthew Morrill</a:t>
             </a:r>
             <a:endParaRPr lang="en-US" dirty="0"/>
           </a:p>
@@ -7115,6 +7657,10 @@
           <a:bodyPr/>
           <a:lstStyle/>
           <a:p>
+            <a:r>
+              <a:rPr lang="en-US" dirty="0" smtClean="0"/>
+              <a:t>NBAI</a:t>
+            </a:r>
             <a:endParaRPr lang="en-US" dirty="0"/>
           </a:p>
         </p:txBody>
@@ -7124,6 +7670,13 @@
   <p:clrMapOvr>
     <a:masterClrMapping/>
   </p:clrMapOvr>
+  <p:timing>
+    <p:tnLst>
+      <p:par>
+        <p:cTn id="1" dur="indefinite" restart="never" nodeType="tmRoot"/>
+      </p:par>
+    </p:tnLst>
+  </p:timing>
 </p:sld>
 </file>
 
@@ -7161,7 +7714,7 @@
           <a:p>
             <a:r>
               <a:rPr lang="en-US" dirty="0" smtClean="0"/>
-              <a:t>Matthew Morrill</a:t>
+              <a:t>John Parks</a:t>
             </a:r>
             <a:endParaRPr lang="en-US" dirty="0"/>
           </a:p>
@@ -7182,10 +7735,6 @@
           <a:bodyPr/>
           <a:lstStyle/>
           <a:p>
-            <a:r>
-              <a:rPr lang="en-US" dirty="0" smtClean="0"/>
-              <a:t>NBAI</a:t>
-            </a:r>
             <a:endParaRPr lang="en-US" dirty="0"/>
           </a:p>
         </p:txBody>
@@ -7195,6 +7744,13 @@
   <p:clrMapOvr>
     <a:masterClrMapping/>
   </p:clrMapOvr>
+  <p:timing>
+    <p:tnLst>
+      <p:par>
+        <p:cTn id="1" dur="indefinite" restart="never" nodeType="tmRoot"/>
+      </p:par>
+    </p:tnLst>
+  </p:timing>
 </p:sld>
 </file>
 

</xml_diff>

<commit_message>
*put my PostMortem into the repository for you guys to check out if you want. Change, if necessary. *updated my slide on the powerpoint.
</commit_message>
<xml_diff>
--- a/Senior Project Files/Time Warrior.pptx
+++ b/Senior Project Files/Time Warrior.pptx
@@ -208,7 +208,7 @@
             <a:fld id="{FDA7BB9C-8931-4132-81CE-068281051B41}" type="datetimeFigureOut">
               <a:rPr lang="en-US" smtClean="0"/>
               <a:pPr/>
-              <a:t>6/19/2011</a:t>
+              <a:t>6/20/2011</a:t>
             </a:fld>
             <a:endParaRPr lang="en-US"/>
           </a:p>
@@ -2107,7 +2107,7 @@
             <a:fld id="{43D57B9B-B8D0-4621-A0A3-A98D4B06B1CD}" type="datetimeFigureOut">
               <a:rPr lang="en-US" smtClean="0"/>
               <a:pPr/>
-              <a:t>6/19/2011</a:t>
+              <a:t>6/20/2011</a:t>
             </a:fld>
             <a:endParaRPr lang="en-US"/>
           </a:p>
@@ -2274,7 +2274,7 @@
             <a:fld id="{43D57B9B-B8D0-4621-A0A3-A98D4B06B1CD}" type="datetimeFigureOut">
               <a:rPr lang="en-US" smtClean="0"/>
               <a:pPr/>
-              <a:t>6/19/2011</a:t>
+              <a:t>6/20/2011</a:t>
             </a:fld>
             <a:endParaRPr lang="en-US"/>
           </a:p>
@@ -2451,7 +2451,7 @@
             <a:fld id="{43D57B9B-B8D0-4621-A0A3-A98D4B06B1CD}" type="datetimeFigureOut">
               <a:rPr lang="en-US" smtClean="0"/>
               <a:pPr/>
-              <a:t>6/19/2011</a:t>
+              <a:t>6/20/2011</a:t>
             </a:fld>
             <a:endParaRPr lang="en-US"/>
           </a:p>
@@ -2622,7 +2622,7 @@
             <a:fld id="{43D57B9B-B8D0-4621-A0A3-A98D4B06B1CD}" type="datetimeFigureOut">
               <a:rPr lang="en-US" smtClean="0"/>
               <a:pPr/>
-              <a:t>6/19/2011</a:t>
+              <a:t>6/20/2011</a:t>
             </a:fld>
             <a:endParaRPr lang="en-US"/>
           </a:p>
@@ -3079,7 +3079,7 @@
             <a:fld id="{43D57B9B-B8D0-4621-A0A3-A98D4B06B1CD}" type="datetimeFigureOut">
               <a:rPr lang="en-US" smtClean="0"/>
               <a:pPr/>
-              <a:t>6/19/2011</a:t>
+              <a:t>6/20/2011</a:t>
             </a:fld>
             <a:endParaRPr lang="en-US"/>
           </a:p>
@@ -3345,7 +3345,7 @@
             <a:fld id="{43D57B9B-B8D0-4621-A0A3-A98D4B06B1CD}" type="datetimeFigureOut">
               <a:rPr lang="en-US" smtClean="0"/>
               <a:pPr/>
-              <a:t>6/19/2011</a:t>
+              <a:t>6/20/2011</a:t>
             </a:fld>
             <a:endParaRPr lang="en-US"/>
           </a:p>
@@ -3721,7 +3721,7 @@
             <a:fld id="{43D57B9B-B8D0-4621-A0A3-A98D4B06B1CD}" type="datetimeFigureOut">
               <a:rPr lang="en-US" smtClean="0"/>
               <a:pPr/>
-              <a:t>6/19/2011</a:t>
+              <a:t>6/20/2011</a:t>
             </a:fld>
             <a:endParaRPr lang="en-US"/>
           </a:p>
@@ -3845,7 +3845,7 @@
             <a:fld id="{43D57B9B-B8D0-4621-A0A3-A98D4B06B1CD}" type="datetimeFigureOut">
               <a:rPr lang="en-US" smtClean="0"/>
               <a:pPr/>
-              <a:t>6/19/2011</a:t>
+              <a:t>6/20/2011</a:t>
             </a:fld>
             <a:endParaRPr lang="en-US"/>
           </a:p>
@@ -3937,7 +3937,7 @@
             <a:fld id="{43D57B9B-B8D0-4621-A0A3-A98D4B06B1CD}" type="datetimeFigureOut">
               <a:rPr lang="en-US" smtClean="0"/>
               <a:pPr/>
-              <a:t>6/19/2011</a:t>
+              <a:t>6/20/2011</a:t>
             </a:fld>
             <a:endParaRPr lang="en-US"/>
           </a:p>
@@ -4188,7 +4188,7 @@
             <a:fld id="{43D57B9B-B8D0-4621-A0A3-A98D4B06B1CD}" type="datetimeFigureOut">
               <a:rPr lang="en-US" smtClean="0"/>
               <a:pPr/>
-              <a:t>6/19/2011</a:t>
+              <a:t>6/20/2011</a:t>
             </a:fld>
             <a:endParaRPr lang="en-US"/>
           </a:p>
@@ -4449,7 +4449,7 @@
             <a:fld id="{43D57B9B-B8D0-4621-A0A3-A98D4B06B1CD}" type="datetimeFigureOut">
               <a:rPr lang="en-US" smtClean="0"/>
               <a:pPr/>
-              <a:t>6/19/2011</a:t>
+              <a:t>6/20/2011</a:t>
             </a:fld>
             <a:endParaRPr lang="en-US"/>
           </a:p>
@@ -4855,7 +4855,7 @@
             <a:fld id="{43D57B9B-B8D0-4621-A0A3-A98D4B06B1CD}" type="datetimeFigureOut">
               <a:rPr lang="en-US" smtClean="0"/>
               <a:pPr/>
-              <a:t>6/19/2011</a:t>
+              <a:t>6/20/2011</a:t>
             </a:fld>
             <a:endParaRPr lang="en-US"/>
           </a:p>
@@ -5317,13 +5317,8 @@
           <a:p>
             <a:r>
               <a:rPr lang="en-US" dirty="0" smtClean="0"/>
-              <a:t>John </a:t>
-            </a:r>
-            <a:r>
-              <a:rPr lang="en-US" dirty="0" smtClean="0"/>
-              <a:t>Parks</a:t>
-            </a:r>
-            <a:endParaRPr lang="en-US" dirty="0" smtClean="0"/>
+              <a:t>John Parks</a:t>
+            </a:r>
           </a:p>
           <a:p>
             <a:r>
@@ -6096,11 +6091,7 @@
           <a:p>
             <a:r>
               <a:rPr lang="en-US" dirty="0" smtClean="0"/>
-              <a:t>D</a:t>
-            </a:r>
-            <a:r>
-              <a:rPr lang="en-US" dirty="0" smtClean="0"/>
-              <a:t>ynamic Enemies</a:t>
+              <a:t>Dynamic Enemies</a:t>
             </a:r>
           </a:p>
           <a:p>
@@ -6113,11 +6104,7 @@
             </a:r>
             <a:r>
               <a:rPr lang="en-US" dirty="0" err="1" smtClean="0"/>
-              <a:t>G</a:t>
-            </a:r>
-            <a:r>
-              <a:rPr lang="en-US" dirty="0" err="1" smtClean="0"/>
-              <a:t>ameplay</a:t>
+              <a:t>Gameplay</a:t>
             </a:r>
             <a:endParaRPr lang="en-US" dirty="0" smtClean="0"/>
           </a:p>
@@ -6127,15 +6114,7 @@
           <a:p>
             <a:r>
               <a:rPr lang="en-US" dirty="0" smtClean="0"/>
-              <a:t>All Single-Player </a:t>
-            </a:r>
-            <a:r>
-              <a:rPr lang="en-US" dirty="0" smtClean="0"/>
-              <a:t>S</a:t>
-            </a:r>
-            <a:r>
-              <a:rPr lang="en-US" dirty="0" smtClean="0"/>
-              <a:t>kills</a:t>
+              <a:t>All Single-Player Skills</a:t>
             </a:r>
           </a:p>
         </p:txBody>
@@ -6274,15 +6253,7 @@
           <a:p>
             <a:r>
               <a:rPr lang="en-US" dirty="0" smtClean="0"/>
-              <a:t>Get in </a:t>
-            </a:r>
-            <a:r>
-              <a:rPr lang="en-US" dirty="0" smtClean="0"/>
-              <a:t>Three </a:t>
-            </a:r>
-            <a:r>
-              <a:rPr lang="en-US" dirty="0" smtClean="0"/>
-              <a:t>Remaining Worlds</a:t>
+              <a:t>Get in Three Remaining Worlds</a:t>
             </a:r>
           </a:p>
           <a:p>
@@ -6300,11 +6271,7 @@
           <a:p>
             <a:r>
               <a:rPr lang="en-US" dirty="0" smtClean="0"/>
-              <a:t>Better </a:t>
-            </a:r>
-            <a:r>
-              <a:rPr lang="en-US" dirty="0" smtClean="0"/>
-              <a:t>Character Art</a:t>
+              <a:t>Better Character Art</a:t>
             </a:r>
           </a:p>
           <a:p>
@@ -6313,11 +6280,7 @@
           <a:p>
             <a:r>
               <a:rPr lang="en-US" dirty="0" smtClean="0"/>
-              <a:t>BALANCE</a:t>
-            </a:r>
-            <a:r>
-              <a:rPr lang="en-US" dirty="0" smtClean="0"/>
-              <a:t>!!!!!</a:t>
+              <a:t>BALANCE!!!!!</a:t>
             </a:r>
           </a:p>
         </p:txBody>
@@ -6401,7 +6364,6 @@
               <a:rPr lang="en-US" dirty="0" smtClean="0"/>
               <a:t>EST</a:t>
             </a:r>
-            <a:endParaRPr lang="en-US" dirty="0" smtClean="0"/>
           </a:p>
           <a:p>
             <a:pPr algn="ctr">
@@ -6409,21 +6371,8 @@
             </a:pPr>
             <a:r>
               <a:rPr lang="en-US" dirty="0" smtClean="0"/>
-              <a:t>U</a:t>
-            </a:r>
-            <a:r>
-              <a:rPr lang="en-US" dirty="0" smtClean="0"/>
-              <a:t>	</a:t>
-            </a:r>
-            <a:r>
-              <a:rPr lang="en-US" dirty="0" smtClean="0"/>
-              <a:t>		</a:t>
-            </a:r>
-            <a:r>
-              <a:rPr lang="en-US" dirty="0" smtClean="0"/>
-              <a:t>I</a:t>
-            </a:r>
-            <a:endParaRPr lang="en-US" dirty="0" smtClean="0"/>
+              <a:t>U			I</a:t>
+            </a:r>
           </a:p>
           <a:p>
             <a:pPr algn="ctr">
@@ -6440,15 +6389,7 @@
             </a:pPr>
             <a:r>
               <a:rPr lang="en-US" dirty="0" smtClean="0"/>
-              <a:t>	</a:t>
-            </a:r>
-            <a:r>
-              <a:rPr lang="en-US" dirty="0" smtClean="0"/>
-              <a:t>	</a:t>
-            </a:r>
-            <a:r>
-              <a:rPr lang="en-US" dirty="0" smtClean="0"/>
-              <a:t>N</a:t>
+              <a:t>		N</a:t>
             </a:r>
           </a:p>
           <a:p>
@@ -6615,15 +6556,7 @@
                     <a:p>
                       <a:r>
                         <a:rPr lang="en-US" sz="1800" dirty="0" smtClean="0"/>
-                        <a:t>Lead </a:t>
-                      </a:r>
-                      <a:r>
-                        <a:rPr lang="en-US" sz="1800" dirty="0" smtClean="0"/>
-                        <a:t>Designer, Art Design, World </a:t>
-                      </a:r>
-                      <a:r>
-                        <a:rPr lang="en-US" sz="1800" dirty="0" smtClean="0"/>
-                        <a:t>Designer</a:t>
+                        <a:t>Lead Designer, Art Design, World Designer</a:t>
                       </a:r>
                       <a:endParaRPr lang="en-US" dirty="0"/>
                     </a:p>
@@ -6827,11 +6760,7 @@
           <a:p>
             <a:r>
               <a:rPr lang="en-US" dirty="0" smtClean="0"/>
-              <a:t>Time </a:t>
-            </a:r>
-            <a:r>
-              <a:rPr lang="en-US" dirty="0" smtClean="0"/>
-              <a:t>Warrior</a:t>
+              <a:t>Time Warrior</a:t>
             </a:r>
             <a:endParaRPr lang="en-US" dirty="0"/>
           </a:p>
@@ -6854,35 +6783,19 @@
           <a:p>
             <a:r>
               <a:rPr lang="en-US" dirty="0" smtClean="0"/>
-              <a:t>Homage </a:t>
-            </a:r>
-            <a:r>
-              <a:rPr lang="en-US" dirty="0" smtClean="0"/>
-              <a:t>to Zelda, Diablo, Elder </a:t>
-            </a:r>
-            <a:r>
-              <a:rPr lang="en-US" dirty="0" smtClean="0"/>
-              <a:t>Scrolls</a:t>
-            </a:r>
-          </a:p>
-          <a:p>
-            <a:r>
-              <a:rPr lang="en-US" dirty="0" smtClean="0"/>
-              <a:t>2D Action </a:t>
-            </a:r>
-            <a:r>
-              <a:rPr lang="en-US" dirty="0" smtClean="0"/>
-              <a:t>RPG</a:t>
-            </a:r>
-          </a:p>
-          <a:p>
-            <a:r>
-              <a:rPr lang="en-US" dirty="0" smtClean="0"/>
-              <a:t>Fantasy </a:t>
-            </a:r>
-            <a:r>
-              <a:rPr lang="en-US" dirty="0" smtClean="0"/>
-              <a:t>Sci-fi</a:t>
+              <a:t>Homage to Zelda, Diablo, Elder Scrolls</a:t>
+            </a:r>
+          </a:p>
+          <a:p>
+            <a:r>
+              <a:rPr lang="en-US" dirty="0" smtClean="0"/>
+              <a:t>2D Action RPG</a:t>
+            </a:r>
+          </a:p>
+          <a:p>
+            <a:r>
+              <a:rPr lang="en-US" dirty="0" smtClean="0"/>
+              <a:t>Fantasy Sci-fi</a:t>
             </a:r>
             <a:endParaRPr lang="en-US" dirty="0"/>
           </a:p>
@@ -6985,24 +6898,14 @@
           <a:p>
             <a:r>
               <a:rPr lang="en-US" dirty="0" smtClean="0"/>
-              <a:t>Day/Night cycle based on system </a:t>
-            </a:r>
-            <a:r>
-              <a:rPr lang="en-US" dirty="0" smtClean="0"/>
-              <a:t>time</a:t>
-            </a:r>
-            <a:endParaRPr lang="en-US" dirty="0" smtClean="0"/>
-          </a:p>
-          <a:p>
-            <a:r>
-              <a:rPr lang="en-US" dirty="0" smtClean="0"/>
-              <a:t>Scripting </a:t>
-            </a:r>
-            <a:r>
-              <a:rPr lang="en-US" dirty="0" smtClean="0"/>
-              <a:t>Engine</a:t>
-            </a:r>
-            <a:endParaRPr lang="en-US" dirty="0" smtClean="0"/>
+              <a:t>Day/Night cycle based on system time</a:t>
+            </a:r>
+          </a:p>
+          <a:p>
+            <a:r>
+              <a:rPr lang="en-US" dirty="0" smtClean="0"/>
+              <a:t>Scripting Engine</a:t>
+            </a:r>
           </a:p>
           <a:p>
             <a:r>
@@ -7209,11 +7112,7 @@
           <a:p>
             <a:r>
               <a:rPr lang="en-US" dirty="0" smtClean="0"/>
-              <a:t>Code </a:t>
-            </a:r>
-            <a:r>
-              <a:rPr lang="en-US" dirty="0" smtClean="0"/>
-              <a:t>Meshed Well</a:t>
+              <a:t>Code Meshed Well</a:t>
             </a:r>
           </a:p>
           <a:p>
@@ -7222,17 +7121,8 @@
           <a:p>
             <a:r>
               <a:rPr lang="en-US" dirty="0" smtClean="0"/>
-              <a:t>Skill </a:t>
-            </a:r>
-            <a:r>
-              <a:rPr lang="en-US" dirty="0" smtClean="0"/>
-              <a:t>L</a:t>
-            </a:r>
-            <a:r>
-              <a:rPr lang="en-US" dirty="0" smtClean="0"/>
-              <a:t>evels Matched</a:t>
-            </a:r>
-            <a:endParaRPr lang="en-US" dirty="0" smtClean="0"/>
+              <a:t>Skill Levels Matched</a:t>
+            </a:r>
           </a:p>
           <a:p>
             <a:pPr lvl="1"/>
@@ -7268,11 +7158,7 @@
           <a:p>
             <a:r>
               <a:rPr lang="en-US" dirty="0" smtClean="0"/>
-              <a:t>Code </a:t>
-            </a:r>
-            <a:r>
-              <a:rPr lang="en-US" dirty="0" smtClean="0"/>
-              <a:t>Modified without Asking</a:t>
+              <a:t>Code Modified without Asking</a:t>
             </a:r>
           </a:p>
           <a:p>
@@ -7288,11 +7174,7 @@
             <a:pPr lvl="1"/>
             <a:r>
               <a:rPr lang="en-US" dirty="0" smtClean="0"/>
-              <a:t>Alex in San </a:t>
-            </a:r>
-            <a:r>
-              <a:rPr lang="en-US" dirty="0" smtClean="0"/>
-              <a:t>Mateo</a:t>
+              <a:t>Alex in San Mateo</a:t>
             </a:r>
           </a:p>
           <a:p>
@@ -7306,17 +7188,8 @@
             <a:pPr lvl="1"/>
             <a:r>
               <a:rPr lang="en-US" dirty="0" smtClean="0"/>
-              <a:t>John in </a:t>
-            </a:r>
-            <a:r>
-              <a:rPr lang="en-US" dirty="0" smtClean="0"/>
-              <a:t>San </a:t>
-            </a:r>
-            <a:r>
-              <a:rPr lang="en-US" dirty="0" smtClean="0"/>
-              <a:t>Jose</a:t>
-            </a:r>
-            <a:endParaRPr lang="en-US" dirty="0" smtClean="0"/>
+              <a:t>John in San Jose</a:t>
+            </a:r>
           </a:p>
         </p:txBody>
       </p:sp>
@@ -7393,13 +7266,8 @@
           <a:p>
             <a:r>
               <a:rPr lang="en-US" dirty="0" smtClean="0"/>
-              <a:t>Largely </a:t>
-            </a:r>
-            <a:r>
-              <a:rPr lang="en-US" dirty="0" smtClean="0"/>
-              <a:t>Complex Ideas</a:t>
-            </a:r>
-            <a:endParaRPr lang="en-US" dirty="0" smtClean="0"/>
+              <a:t>Largely Complex Ideas</a:t>
+            </a:r>
           </a:p>
           <a:p>
             <a:r>
@@ -7410,69 +7278,32 @@
           <a:p>
             <a:r>
               <a:rPr lang="en-US" dirty="0" smtClean="0"/>
-              <a:t>Computer </a:t>
-            </a:r>
-            <a:r>
-              <a:rPr lang="en-US" dirty="0" smtClean="0"/>
-              <a:t>Issues</a:t>
-            </a:r>
-            <a:endParaRPr lang="en-US" dirty="0" smtClean="0"/>
-          </a:p>
-          <a:p>
-            <a:r>
-              <a:rPr lang="en-US" dirty="0" smtClean="0"/>
-              <a:t>Low </a:t>
-            </a:r>
-            <a:r>
-              <a:rPr lang="en-US" dirty="0" smtClean="0"/>
-              <a:t>Networking Knowledge</a:t>
-            </a:r>
-            <a:endParaRPr lang="en-US" dirty="0" smtClean="0"/>
-          </a:p>
-          <a:p>
-            <a:r>
-              <a:rPr lang="en-US" dirty="0" smtClean="0"/>
-              <a:t>No </a:t>
-            </a:r>
-            <a:r>
-              <a:rPr lang="en-US" dirty="0" smtClean="0"/>
-              <a:t>D</a:t>
-            </a:r>
-            <a:r>
-              <a:rPr lang="en-US" dirty="0" smtClean="0"/>
-              <a:t>edicated Artist</a:t>
-            </a:r>
-            <a:endParaRPr lang="en-US" dirty="0" smtClean="0"/>
-          </a:p>
-          <a:p>
-            <a:r>
-              <a:rPr lang="en-US" dirty="0" smtClean="0"/>
-              <a:t>Hard </a:t>
-            </a:r>
-            <a:r>
-              <a:rPr lang="en-US" dirty="0" smtClean="0"/>
-              <a:t>Delegation </a:t>
-            </a:r>
-            <a:r>
-              <a:rPr lang="en-US" dirty="0" smtClean="0"/>
-              <a:t>of </a:t>
-            </a:r>
-            <a:r>
-              <a:rPr lang="en-US" dirty="0" smtClean="0"/>
-              <a:t>Tasks</a:t>
-            </a:r>
-            <a:endParaRPr lang="en-US" dirty="0" smtClean="0"/>
-          </a:p>
-          <a:p>
-            <a:r>
-              <a:rPr lang="en-US" dirty="0" smtClean="0"/>
-              <a:t>Deadlines </a:t>
-            </a:r>
-            <a:r>
-              <a:rPr lang="en-US" dirty="0" smtClean="0"/>
-              <a:t>Missed</a:t>
-            </a:r>
-            <a:endParaRPr lang="en-US" dirty="0" smtClean="0"/>
+              <a:t>Computer Issues</a:t>
+            </a:r>
+          </a:p>
+          <a:p>
+            <a:r>
+              <a:rPr lang="en-US" dirty="0" smtClean="0"/>
+              <a:t>Low Networking Knowledge</a:t>
+            </a:r>
+          </a:p>
+          <a:p>
+            <a:r>
+              <a:rPr lang="en-US" dirty="0" smtClean="0"/>
+              <a:t>No Dedicated Artist</a:t>
+            </a:r>
+          </a:p>
+          <a:p>
+            <a:r>
+              <a:rPr lang="en-US" dirty="0" smtClean="0"/>
+              <a:t>Hard Delegation of Tasks</a:t>
+            </a:r>
+          </a:p>
+          <a:p>
+            <a:r>
+              <a:rPr lang="en-US" dirty="0" smtClean="0"/>
+              <a:t>Deadlines Missed</a:t>
+            </a:r>
           </a:p>
           <a:p>
             <a:r>
@@ -7659,7 +7490,36 @@
           <a:p>
             <a:r>
               <a:rPr lang="en-US" dirty="0" smtClean="0"/>
-              <a:t>NBAI</a:t>
+              <a:t>Started the scripting</a:t>
+            </a:r>
+          </a:p>
+          <a:p>
+            <a:r>
+              <a:rPr lang="en-US" dirty="0" smtClean="0"/>
+              <a:t>Designed NPC’s, UI, HUD, World, Grid</a:t>
+            </a:r>
+          </a:p>
+          <a:p>
+            <a:r>
+              <a:rPr lang="en-US" dirty="0" smtClean="0"/>
+              <a:t>Almost entirety of </a:t>
+            </a:r>
+            <a:r>
+              <a:rPr lang="en-US" dirty="0" err="1" smtClean="0"/>
+              <a:t>baseEngine</a:t>
+            </a:r>
+            <a:endParaRPr lang="en-US" dirty="0" smtClean="0"/>
+          </a:p>
+          <a:p>
+            <a:r>
+              <a:rPr lang="en-US" dirty="0" smtClean="0"/>
+              <a:t>Second networking person</a:t>
+            </a:r>
+          </a:p>
+          <a:p>
+            <a:r>
+              <a:rPr lang="en-US" dirty="0" smtClean="0"/>
+              <a:t>NBAI – Not Be An Idiot</a:t>
             </a:r>
             <a:endParaRPr lang="en-US" dirty="0"/>
           </a:p>

</xml_diff>

<commit_message>
* added my portion to the ppt
</commit_message>
<xml_diff>
--- a/Senior Project Files/Time Warrior.pptx
+++ b/Senior Project Files/Time Warrior.pptx
@@ -6162,8 +6162,13 @@
           <a:p>
             <a:r>
               <a:rPr lang="en-US" dirty="0" smtClean="0"/>
-              <a:t>Original Ideas of skills</a:t>
-            </a:r>
+              <a:t>Original Ideas of </a:t>
+            </a:r>
+            <a:r>
+              <a:rPr lang="en-US" dirty="0" smtClean="0"/>
+              <a:t>Skills</a:t>
+            </a:r>
+            <a:endParaRPr lang="en-US" dirty="0" smtClean="0"/>
           </a:p>
           <a:p>
             <a:r>
@@ -7485,19 +7490,31 @@
         </p:nvSpPr>
         <p:spPr/>
         <p:txBody>
-          <a:bodyPr/>
-          <a:lstStyle/>
-          <a:p>
-            <a:r>
-              <a:rPr lang="en-US" dirty="0" smtClean="0"/>
-              <a:t>Started the scripting</a:t>
-            </a:r>
-          </a:p>
-          <a:p>
-            <a:r>
-              <a:rPr lang="en-US" dirty="0" smtClean="0"/>
-              <a:t>Designed NPC’s, UI, HUD, World, Grid</a:t>
-            </a:r>
+          <a:bodyPr>
+            <a:normAutofit/>
+          </a:bodyPr>
+          <a:lstStyle/>
+          <a:p>
+            <a:r>
+              <a:rPr lang="en-US" dirty="0" smtClean="0"/>
+              <a:t>Started the </a:t>
+            </a:r>
+            <a:r>
+              <a:rPr lang="en-US" dirty="0" smtClean="0"/>
+              <a:t>scripting</a:t>
+            </a:r>
+            <a:endParaRPr lang="en-US" dirty="0" smtClean="0"/>
+          </a:p>
+          <a:p>
+            <a:r>
+              <a:rPr lang="en-US" dirty="0" smtClean="0"/>
+              <a:t>Designed NPC’s, UI, HUD, World, </a:t>
+            </a:r>
+            <a:r>
+              <a:rPr lang="en-US" dirty="0" smtClean="0"/>
+              <a:t>Grid</a:t>
+            </a:r>
+            <a:endParaRPr lang="en-US" dirty="0" smtClean="0"/>
           </a:p>
           <a:p>
             <a:r>
@@ -7513,8 +7530,13 @@
           <a:p>
             <a:r>
               <a:rPr lang="en-US" dirty="0" smtClean="0"/>
-              <a:t>Second networking person</a:t>
-            </a:r>
+              <a:t>Second networking </a:t>
+            </a:r>
+            <a:r>
+              <a:rPr lang="en-US" dirty="0" smtClean="0"/>
+              <a:t>person</a:t>
+            </a:r>
+            <a:endParaRPr lang="en-US" dirty="0" smtClean="0"/>
           </a:p>
           <a:p>
             <a:r>
@@ -7592,10 +7614,60 @@
         </p:nvSpPr>
         <p:spPr/>
         <p:txBody>
-          <a:bodyPr/>
-          <a:lstStyle/>
-          <a:p>
-            <a:endParaRPr lang="en-US" dirty="0"/>
+          <a:bodyPr>
+            <a:normAutofit/>
+          </a:bodyPr>
+          <a:lstStyle/>
+          <a:p>
+            <a:r>
+              <a:rPr lang="en-US" dirty="0" smtClean="0"/>
+              <a:t>Designed Chip, Armor, Magic, Weapon</a:t>
+            </a:r>
+          </a:p>
+          <a:p>
+            <a:r>
+              <a:rPr lang="en-US" dirty="0" smtClean="0"/>
+              <a:t>Added Player’s Inventories</a:t>
+            </a:r>
+          </a:p>
+          <a:p>
+            <a:pPr lvl="1"/>
+            <a:r>
+              <a:rPr lang="en-US" dirty="0" smtClean="0"/>
+              <a:t>Armor Inv for Collected Armor</a:t>
+            </a:r>
+          </a:p>
+          <a:p>
+            <a:pPr lvl="1"/>
+            <a:r>
+              <a:rPr lang="en-US" dirty="0" smtClean="0"/>
+              <a:t>Attack Inv for Unlocked Magic &amp; Weapons</a:t>
+            </a:r>
+          </a:p>
+          <a:p>
+            <a:pPr lvl="1"/>
+            <a:r>
+              <a:rPr lang="en-US" dirty="0" smtClean="0"/>
+              <a:t>Gauntlet Inv for Equipped Attacks &amp; Armor</a:t>
+            </a:r>
+          </a:p>
+          <a:p>
+            <a:r>
+              <a:rPr lang="en-US" dirty="0" smtClean="0"/>
+              <a:t>Gave Boss Ability to Use 3 Attacks</a:t>
+            </a:r>
+          </a:p>
+          <a:p>
+            <a:r>
+              <a:rPr lang="en-US" dirty="0" smtClean="0"/>
+              <a:t>Worked with Entity &amp; Chip Collision</a:t>
+            </a:r>
+          </a:p>
+          <a:p>
+            <a:r>
+              <a:rPr lang="en-US" dirty="0" smtClean="0"/>
+              <a:t>Filled Out Other Classes</a:t>
+            </a:r>
           </a:p>
         </p:txBody>
       </p:sp>

</xml_diff>

<commit_message>
Updated my power point part
</commit_message>
<xml_diff>
--- a/Senior Project Files/Time Warrior.pptx
+++ b/Senior Project Files/Time Warrior.pptx
@@ -5459,51 +5459,27 @@
           </a:p>
         </p:txBody>
       </p:sp>
-      <p:sp>
-        <p:nvSpPr>
-          <p:cNvPr id="3" name="Content Placeholder 2"/>
-          <p:cNvSpPr>
-            <a:spLocks noGrp="1"/>
-          </p:cNvSpPr>
-          <p:nvPr>
-            <p:ph idx="1"/>
-          </p:nvPr>
-        </p:nvSpPr>
-        <p:spPr/>
-        <p:txBody>
-          <a:bodyPr/>
-          <a:lstStyle/>
-          <a:p>
-            <a:r>
-              <a:rPr lang="en-US" dirty="0" smtClean="0"/>
-              <a:t>Dungeon 1</a:t>
-            </a:r>
-            <a:endParaRPr lang="en-US" dirty="0"/>
-          </a:p>
-        </p:txBody>
-      </p:sp>
       <p:pic>
         <p:nvPicPr>
-          <p:cNvPr id="4" name="Picture 3" descr="Dungeon 1.jpg"/>
+          <p:cNvPr id="5" name="Content Placeholder 4" descr="scipt2world compare.png"/>
           <p:cNvPicPr>
-            <a:picLocks noChangeAspect="1"/>
+            <a:picLocks noGrp="1" noChangeAspect="1"/>
           </p:cNvPicPr>
-          <p:nvPr/>
+          <p:nvPr>
+            <p:ph idx="1"/>
+          </p:nvPr>
         </p:nvPicPr>
         <p:blipFill>
-          <a:blip r:embed="rId3" cstate="print"/>
+          <a:blip r:embed="rId3"/>
           <a:stretch>
             <a:fillRect/>
           </a:stretch>
         </p:blipFill>
         <p:spPr>
           <a:xfrm>
-            <a:off x="1562100" y="2151343"/>
-            <a:ext cx="6019800" cy="4706657"/>
+            <a:off x="457200" y="2205015"/>
+            <a:ext cx="7467600" cy="3316332"/>
           </a:xfrm>
-          <a:prstGeom prst="rect">
-            <a:avLst/>
-          </a:prstGeom>
         </p:spPr>
       </p:pic>
     </p:spTree>
@@ -6162,13 +6138,8 @@
           <a:p>
             <a:r>
               <a:rPr lang="en-US" dirty="0" smtClean="0"/>
-              <a:t>Original Ideas of </a:t>
-            </a:r>
-            <a:r>
-              <a:rPr lang="en-US" dirty="0" smtClean="0"/>
-              <a:t>Skills</a:t>
-            </a:r>
-            <a:endParaRPr lang="en-US" dirty="0" smtClean="0"/>
+              <a:t>Original Ideas of Skills</a:t>
+            </a:r>
           </a:p>
           <a:p>
             <a:r>
@@ -7328,7 +7299,18 @@
           <p:nvPr/>
         </p:nvPicPr>
         <p:blipFill>
-          <a:blip r:embed="rId3" cstate="print"/>
+          <a:blip r:embed="rId3" cstate="print">
+            <a:clrChange>
+              <a:clrFrom>
+                <a:srgbClr val="FDFEF8"/>
+              </a:clrFrom>
+              <a:clrTo>
+                <a:srgbClr val="FDFEF8">
+                  <a:alpha val="0"/>
+                </a:srgbClr>
+              </a:clrTo>
+            </a:clrChange>
+          </a:blip>
           <a:stretch>
             <a:fillRect/>
           </a:stretch>
@@ -7415,13 +7397,153 @@
         </p:nvSpPr>
         <p:spPr/>
         <p:txBody>
-          <a:bodyPr/>
-          <a:lstStyle/>
-          <a:p>
-            <a:endParaRPr lang="en-US" dirty="0"/>
-          </a:p>
-        </p:txBody>
-      </p:sp>
+          <a:bodyPr>
+            <a:normAutofit fontScale="92500" lnSpcReduction="10000"/>
+          </a:bodyPr>
+          <a:lstStyle/>
+          <a:p>
+            <a:r>
+              <a:rPr lang="en-US" dirty="0" smtClean="0"/>
+              <a:t>Started our entity class</a:t>
+            </a:r>
+          </a:p>
+          <a:p>
+            <a:pPr lvl="1"/>
+            <a:r>
+              <a:rPr lang="en-US" dirty="0" smtClean="0"/>
+              <a:t>Most things are based on </a:t>
+            </a:r>
+            <a:r>
+              <a:rPr lang="en-US" dirty="0" smtClean="0"/>
+              <a:t>entity</a:t>
+            </a:r>
+            <a:endParaRPr lang="en-US" dirty="0" smtClean="0"/>
+          </a:p>
+          <a:p>
+            <a:r>
+              <a:rPr lang="en-US" dirty="0" smtClean="0"/>
+              <a:t>Designed the worlds</a:t>
+            </a:r>
+          </a:p>
+          <a:p>
+            <a:r>
+              <a:rPr lang="en-US" dirty="0" smtClean="0"/>
+              <a:t>Art</a:t>
+            </a:r>
+          </a:p>
+          <a:p>
+            <a:pPr lvl="1"/>
+            <a:r>
+              <a:rPr lang="en-US" dirty="0" smtClean="0"/>
+              <a:t>World and most of the characters</a:t>
+            </a:r>
+          </a:p>
+          <a:p>
+            <a:r>
+              <a:rPr lang="en-US" dirty="0" smtClean="0"/>
+              <a:t>Audio</a:t>
+            </a:r>
+          </a:p>
+          <a:p>
+            <a:pPr lvl="1"/>
+            <a:r>
+              <a:rPr lang="en-US" dirty="0" smtClean="0"/>
+              <a:t>Found someone do donate their music</a:t>
+            </a:r>
+          </a:p>
+          <a:p>
+            <a:pPr lvl="1"/>
+            <a:r>
+              <a:rPr lang="en-US" dirty="0" smtClean="0"/>
+              <a:t>Determined when and how to play the files</a:t>
+            </a:r>
+          </a:p>
+          <a:p>
+            <a:r>
+              <a:rPr lang="en-US" dirty="0" smtClean="0"/>
+              <a:t>Minion/Boss Ai</a:t>
+            </a:r>
+          </a:p>
+          <a:p>
+            <a:r>
+              <a:rPr lang="en-US" dirty="0" smtClean="0"/>
+              <a:t>Created the installer file</a:t>
+            </a:r>
+            <a:endParaRPr lang="en-US" dirty="0" smtClean="0"/>
+          </a:p>
+        </p:txBody>
+      </p:sp>
+      <p:pic>
+        <p:nvPicPr>
+          <p:cNvPr id="4" name="Picture 3" descr="demon1.jpg"/>
+          <p:cNvPicPr>
+            <a:picLocks noChangeAspect="1"/>
+          </p:cNvPicPr>
+          <p:nvPr/>
+        </p:nvPicPr>
+        <p:blipFill>
+          <a:blip r:embed="rId3">
+            <a:clrChange>
+              <a:clrFrom>
+                <a:srgbClr val="FFFFFD"/>
+              </a:clrFrom>
+              <a:clrTo>
+                <a:srgbClr val="FFFFFD">
+                  <a:alpha val="0"/>
+                </a:srgbClr>
+              </a:clrTo>
+            </a:clrChange>
+          </a:blip>
+          <a:stretch>
+            <a:fillRect/>
+          </a:stretch>
+        </p:blipFill>
+        <p:spPr>
+          <a:xfrm>
+            <a:off x="6934200" y="3276600"/>
+            <a:ext cx="721360" cy="676275"/>
+          </a:xfrm>
+          <a:prstGeom prst="rect">
+            <a:avLst/>
+          </a:prstGeom>
+        </p:spPr>
+      </p:pic>
+      <p:pic>
+        <p:nvPicPr>
+          <p:cNvPr id="5" name="Picture 4" descr="knight2.png"/>
+          <p:cNvPicPr>
+            <a:picLocks noChangeAspect="1"/>
+          </p:cNvPicPr>
+          <p:nvPr/>
+        </p:nvPicPr>
+        <p:blipFill>
+          <a:blip r:embed="rId4">
+            <a:clrChange>
+              <a:clrFrom>
+                <a:srgbClr val="FFFFFF"/>
+              </a:clrFrom>
+              <a:clrTo>
+                <a:srgbClr val="FFFFFF">
+                  <a:alpha val="0"/>
+                </a:srgbClr>
+              </a:clrTo>
+            </a:clrChange>
+          </a:blip>
+          <a:stretch>
+            <a:fillRect/>
+          </a:stretch>
+        </p:blipFill>
+        <p:spPr>
+          <a:xfrm>
+            <a:off x="6096000" y="3200400"/>
+            <a:ext cx="608572" cy="676190"/>
+          </a:xfrm>
+          <a:prstGeom prst="rect">
+            <a:avLst/>
+          </a:prstGeom>
+          <a:effectLst/>
+        </p:spPr>
+      </p:pic>
     </p:spTree>
   </p:cSld>
   <p:clrMapOvr>
@@ -7497,24 +7619,14 @@
           <a:p>
             <a:r>
               <a:rPr lang="en-US" dirty="0" smtClean="0"/>
-              <a:t>Started the </a:t>
-            </a:r>
-            <a:r>
-              <a:rPr lang="en-US" dirty="0" smtClean="0"/>
-              <a:t>scripting</a:t>
-            </a:r>
-            <a:endParaRPr lang="en-US" dirty="0" smtClean="0"/>
-          </a:p>
-          <a:p>
-            <a:r>
-              <a:rPr lang="en-US" dirty="0" smtClean="0"/>
-              <a:t>Designed NPC’s, UI, HUD, World, </a:t>
-            </a:r>
-            <a:r>
-              <a:rPr lang="en-US" dirty="0" smtClean="0"/>
-              <a:t>Grid</a:t>
-            </a:r>
-            <a:endParaRPr lang="en-US" dirty="0" smtClean="0"/>
+              <a:t>Started the scripting</a:t>
+            </a:r>
+          </a:p>
+          <a:p>
+            <a:r>
+              <a:rPr lang="en-US" dirty="0" smtClean="0"/>
+              <a:t>Designed NPC’s, UI, HUD, World, Grid</a:t>
+            </a:r>
           </a:p>
           <a:p>
             <a:r>
@@ -7530,13 +7642,8 @@
           <a:p>
             <a:r>
               <a:rPr lang="en-US" dirty="0" smtClean="0"/>
-              <a:t>Second networking </a:t>
-            </a:r>
-            <a:r>
-              <a:rPr lang="en-US" dirty="0" smtClean="0"/>
-              <a:t>person</a:t>
-            </a:r>
-            <a:endParaRPr lang="en-US" dirty="0" smtClean="0"/>
+              <a:t>Second networking person</a:t>
+            </a:r>
           </a:p>
           <a:p>
             <a:r>

</xml_diff>

<commit_message>
Added a slide for the playable characters right after my slide so i will talk on them
</commit_message>
<xml_diff>
--- a/Senior Project Files/Time Warrior.pptx
+++ b/Senior Project Files/Time Warrior.pptx
@@ -5,7 +5,7 @@
     <p:sldMasterId id="2147483708" r:id="rId1"/>
   </p:sldMasterIdLst>
   <p:notesMasterIdLst>
-    <p:notesMasterId r:id="rId22"/>
+    <p:notesMasterId r:id="rId23"/>
   </p:notesMasterIdLst>
   <p:sldIdLst>
     <p:sldId id="256" r:id="rId2"/>
@@ -15,19 +15,20 @@
     <p:sldId id="259" r:id="rId6"/>
     <p:sldId id="260" r:id="rId7"/>
     <p:sldId id="261" r:id="rId8"/>
-    <p:sldId id="273" r:id="rId9"/>
-    <p:sldId id="272" r:id="rId10"/>
-    <p:sldId id="274" r:id="rId11"/>
-    <p:sldId id="264" r:id="rId12"/>
-    <p:sldId id="278" r:id="rId13"/>
-    <p:sldId id="281" r:id="rId14"/>
-    <p:sldId id="270" r:id="rId15"/>
-    <p:sldId id="269" r:id="rId16"/>
-    <p:sldId id="280" r:id="rId17"/>
-    <p:sldId id="279" r:id="rId18"/>
-    <p:sldId id="275" r:id="rId19"/>
-    <p:sldId id="276" r:id="rId20"/>
-    <p:sldId id="277" r:id="rId21"/>
+    <p:sldId id="282" r:id="rId9"/>
+    <p:sldId id="273" r:id="rId10"/>
+    <p:sldId id="272" r:id="rId11"/>
+    <p:sldId id="274" r:id="rId12"/>
+    <p:sldId id="264" r:id="rId13"/>
+    <p:sldId id="278" r:id="rId14"/>
+    <p:sldId id="281" r:id="rId15"/>
+    <p:sldId id="270" r:id="rId16"/>
+    <p:sldId id="269" r:id="rId17"/>
+    <p:sldId id="280" r:id="rId18"/>
+    <p:sldId id="279" r:id="rId19"/>
+    <p:sldId id="275" r:id="rId20"/>
+    <p:sldId id="276" r:id="rId21"/>
+    <p:sldId id="277" r:id="rId22"/>
   </p:sldIdLst>
   <p:sldSz cx="9144000" cy="6858000" type="screen4x3"/>
   <p:notesSz cx="6858000" cy="9144000"/>
@@ -2679,7 +2680,7 @@
   <dgm:whole/>
   <dgm:extLst>
     <a:ext uri="http://schemas.microsoft.com/office/drawing/2008/diagram">
-      <dsp:dataModelExt xmlns:dsp="http://schemas.microsoft.com/office/drawing/2008/diagram" xmlns="" relId="rId6" minVer="http://schemas.openxmlformats.org/drawingml/2006/diagram"/>
+      <dsp:dataModelExt xmlns="" xmlns:dsp="http://schemas.microsoft.com/office/drawing/2008/diagram" relId="rId6" minVer="http://schemas.openxmlformats.org/drawingml/2006/diagram"/>
     </a:ext>
   </dgm:extLst>
 </dgm:dataModel>
@@ -7201,7 +7202,7 @@
             <a:fld id="{FDA7BB9C-8931-4132-81CE-068281051B41}" type="datetimeFigureOut">
               <a:rPr lang="en-US" smtClean="0"/>
               <a:pPr/>
-              <a:t>6/20/2011</a:t>
+              <a:t>6/21/2011</a:t>
             </a:fld>
             <a:endParaRPr lang="en-US"/>
           </a:p>
@@ -7625,7 +7626,7 @@
             <a:fld id="{650E58FB-5A29-442E-9529-C307D7A41024}" type="slidenum">
               <a:rPr lang="en-US" smtClean="0"/>
               <a:pPr/>
-              <a:t>10</a:t>
+              <a:t>11</a:t>
             </a:fld>
             <a:endParaRPr lang="en-US"/>
           </a:p>
@@ -7715,7 +7716,7 @@
             <a:fld id="{650E58FB-5A29-442E-9529-C307D7A41024}" type="slidenum">
               <a:rPr lang="en-US" smtClean="0"/>
               <a:pPr/>
-              <a:t>11</a:t>
+              <a:t>12</a:t>
             </a:fld>
             <a:endParaRPr lang="en-US"/>
           </a:p>
@@ -7805,7 +7806,7 @@
             <a:fld id="{650E58FB-5A29-442E-9529-C307D7A41024}" type="slidenum">
               <a:rPr lang="en-US" smtClean="0"/>
               <a:pPr/>
-              <a:t>18</a:t>
+              <a:t>19</a:t>
             </a:fld>
             <a:endParaRPr lang="en-US"/>
           </a:p>
@@ -7891,7 +7892,7 @@
             <a:fld id="{650E58FB-5A29-442E-9529-C307D7A41024}" type="slidenum">
               <a:rPr lang="en-US" smtClean="0"/>
               <a:pPr/>
-              <a:t>19</a:t>
+              <a:t>20</a:t>
             </a:fld>
             <a:endParaRPr lang="en-US"/>
           </a:p>
@@ -7981,7 +7982,7 @@
             <a:fld id="{650E58FB-5A29-442E-9529-C307D7A41024}" type="slidenum">
               <a:rPr lang="en-US" smtClean="0"/>
               <a:pPr/>
-              <a:t>20</a:t>
+              <a:t>21</a:t>
             </a:fld>
             <a:endParaRPr lang="en-US"/>
           </a:p>
@@ -8615,7 +8616,7 @@
             <a:fld id="{650E58FB-5A29-442E-9529-C307D7A41024}" type="slidenum">
               <a:rPr lang="en-US" smtClean="0"/>
               <a:pPr/>
-              <a:t>8</a:t>
+              <a:t>9</a:t>
             </a:fld>
             <a:endParaRPr lang="en-US"/>
           </a:p>
@@ -8701,7 +8702,7 @@
             <a:fld id="{650E58FB-5A29-442E-9529-C307D7A41024}" type="slidenum">
               <a:rPr lang="en-US" smtClean="0"/>
               <a:pPr/>
-              <a:t>9</a:t>
+              <a:t>10</a:t>
             </a:fld>
             <a:endParaRPr lang="en-US"/>
           </a:p>
@@ -9100,7 +9101,7 @@
             <a:fld id="{43D57B9B-B8D0-4621-A0A3-A98D4B06B1CD}" type="datetimeFigureOut">
               <a:rPr lang="en-US" smtClean="0"/>
               <a:pPr/>
-              <a:t>6/20/2011</a:t>
+              <a:t>6/21/2011</a:t>
             </a:fld>
             <a:endParaRPr lang="en-US"/>
           </a:p>
@@ -9267,7 +9268,7 @@
             <a:fld id="{43D57B9B-B8D0-4621-A0A3-A98D4B06B1CD}" type="datetimeFigureOut">
               <a:rPr lang="en-US" smtClean="0"/>
               <a:pPr/>
-              <a:t>6/20/2011</a:t>
+              <a:t>6/21/2011</a:t>
             </a:fld>
             <a:endParaRPr lang="en-US"/>
           </a:p>
@@ -9444,7 +9445,7 @@
             <a:fld id="{43D57B9B-B8D0-4621-A0A3-A98D4B06B1CD}" type="datetimeFigureOut">
               <a:rPr lang="en-US" smtClean="0"/>
               <a:pPr/>
-              <a:t>6/20/2011</a:t>
+              <a:t>6/21/2011</a:t>
             </a:fld>
             <a:endParaRPr lang="en-US"/>
           </a:p>
@@ -9615,7 +9616,7 @@
             <a:fld id="{43D57B9B-B8D0-4621-A0A3-A98D4B06B1CD}" type="datetimeFigureOut">
               <a:rPr lang="en-US" smtClean="0"/>
               <a:pPr/>
-              <a:t>6/20/2011</a:t>
+              <a:t>6/21/2011</a:t>
             </a:fld>
             <a:endParaRPr lang="en-US"/>
           </a:p>
@@ -10072,7 +10073,7 @@
             <a:fld id="{43D57B9B-B8D0-4621-A0A3-A98D4B06B1CD}" type="datetimeFigureOut">
               <a:rPr lang="en-US" smtClean="0"/>
               <a:pPr/>
-              <a:t>6/20/2011</a:t>
+              <a:t>6/21/2011</a:t>
             </a:fld>
             <a:endParaRPr lang="en-US"/>
           </a:p>
@@ -10338,7 +10339,7 @@
             <a:fld id="{43D57B9B-B8D0-4621-A0A3-A98D4B06B1CD}" type="datetimeFigureOut">
               <a:rPr lang="en-US" smtClean="0"/>
               <a:pPr/>
-              <a:t>6/20/2011</a:t>
+              <a:t>6/21/2011</a:t>
             </a:fld>
             <a:endParaRPr lang="en-US"/>
           </a:p>
@@ -10714,7 +10715,7 @@
             <a:fld id="{43D57B9B-B8D0-4621-A0A3-A98D4B06B1CD}" type="datetimeFigureOut">
               <a:rPr lang="en-US" smtClean="0"/>
               <a:pPr/>
-              <a:t>6/20/2011</a:t>
+              <a:t>6/21/2011</a:t>
             </a:fld>
             <a:endParaRPr lang="en-US"/>
           </a:p>
@@ -10838,7 +10839,7 @@
             <a:fld id="{43D57B9B-B8D0-4621-A0A3-A98D4B06B1CD}" type="datetimeFigureOut">
               <a:rPr lang="en-US" smtClean="0"/>
               <a:pPr/>
-              <a:t>6/20/2011</a:t>
+              <a:t>6/21/2011</a:t>
             </a:fld>
             <a:endParaRPr lang="en-US"/>
           </a:p>
@@ -10930,7 +10931,7 @@
             <a:fld id="{43D57B9B-B8D0-4621-A0A3-A98D4B06B1CD}" type="datetimeFigureOut">
               <a:rPr lang="en-US" smtClean="0"/>
               <a:pPr/>
-              <a:t>6/20/2011</a:t>
+              <a:t>6/21/2011</a:t>
             </a:fld>
             <a:endParaRPr lang="en-US"/>
           </a:p>
@@ -11181,7 +11182,7 @@
             <a:fld id="{43D57B9B-B8D0-4621-A0A3-A98D4B06B1CD}" type="datetimeFigureOut">
               <a:rPr lang="en-US" smtClean="0"/>
               <a:pPr/>
-              <a:t>6/20/2011</a:t>
+              <a:t>6/21/2011</a:t>
             </a:fld>
             <a:endParaRPr lang="en-US"/>
           </a:p>
@@ -11442,7 +11443,7 @@
             <a:fld id="{43D57B9B-B8D0-4621-A0A3-A98D4B06B1CD}" type="datetimeFigureOut">
               <a:rPr lang="en-US" smtClean="0"/>
               <a:pPr/>
-              <a:t>6/20/2011</a:t>
+              <a:t>6/21/2011</a:t>
             </a:fld>
             <a:endParaRPr lang="en-US"/>
           </a:p>
@@ -11848,7 +11849,7 @@
             <a:fld id="{43D57B9B-B8D0-4621-A0A3-A98D4B06B1CD}" type="datetimeFigureOut">
               <a:rPr lang="en-US" smtClean="0"/>
               <a:pPr/>
-              <a:t>6/20/2011</a:t>
+              <a:t>6/21/2011</a:t>
             </a:fld>
             <a:endParaRPr lang="en-US"/>
           </a:p>
@@ -12372,7 +12373,7 @@
           <a:p>
             <a:r>
               <a:rPr lang="en-US" dirty="0" smtClean="0"/>
-              <a:t>Joe Ortega</a:t>
+              <a:t>John Parks</a:t>
             </a:r>
             <a:endParaRPr lang="en-US" dirty="0"/>
           </a:p>
@@ -12390,10 +12391,60 @@
         </p:nvSpPr>
         <p:spPr/>
         <p:txBody>
-          <a:bodyPr/>
+          <a:bodyPr>
+            <a:normAutofit/>
+          </a:bodyPr>
           <a:lstStyle/>
           <a:p>
-            <a:endParaRPr lang="en-US"/>
+            <a:r>
+              <a:rPr lang="en-US" dirty="0" smtClean="0"/>
+              <a:t>Designed Chip, Armor, Magic, Weapon</a:t>
+            </a:r>
+          </a:p>
+          <a:p>
+            <a:r>
+              <a:rPr lang="en-US" dirty="0" smtClean="0"/>
+              <a:t>Added Player’s Inventories</a:t>
+            </a:r>
+          </a:p>
+          <a:p>
+            <a:pPr lvl="1"/>
+            <a:r>
+              <a:rPr lang="en-US" dirty="0" smtClean="0"/>
+              <a:t>Armor Inv for Collected Armor</a:t>
+            </a:r>
+          </a:p>
+          <a:p>
+            <a:pPr lvl="1"/>
+            <a:r>
+              <a:rPr lang="en-US" dirty="0" smtClean="0"/>
+              <a:t>Attack Inv for Unlocked Magic &amp; Weapons</a:t>
+            </a:r>
+          </a:p>
+          <a:p>
+            <a:pPr lvl="1"/>
+            <a:r>
+              <a:rPr lang="en-US" dirty="0" smtClean="0"/>
+              <a:t>Gauntlet Inv for Equipped Attacks &amp; Armor</a:t>
+            </a:r>
+          </a:p>
+          <a:p>
+            <a:r>
+              <a:rPr lang="en-US" dirty="0" smtClean="0"/>
+              <a:t>Gave Boss Ability to Use 3 Attacks</a:t>
+            </a:r>
+          </a:p>
+          <a:p>
+            <a:r>
+              <a:rPr lang="en-US" dirty="0" smtClean="0"/>
+              <a:t>Worked with Entity &amp; Chip Collision</a:t>
+            </a:r>
+          </a:p>
+          <a:p>
+            <a:r>
+              <a:rPr lang="en-US" dirty="0" smtClean="0"/>
+              <a:t>Filled Out Other Classes</a:t>
+            </a:r>
           </a:p>
         </p:txBody>
       </p:sp>
@@ -12446,6 +12497,80 @@
           <a:p>
             <a:r>
               <a:rPr lang="en-US" dirty="0" smtClean="0"/>
+              <a:t>Joe Ortega</a:t>
+            </a:r>
+            <a:endParaRPr lang="en-US" dirty="0"/>
+          </a:p>
+        </p:txBody>
+      </p:sp>
+      <p:sp>
+        <p:nvSpPr>
+          <p:cNvPr id="3" name="Content Placeholder 2"/>
+          <p:cNvSpPr>
+            <a:spLocks noGrp="1"/>
+          </p:cNvSpPr>
+          <p:nvPr>
+            <p:ph idx="1"/>
+          </p:nvPr>
+        </p:nvSpPr>
+        <p:spPr/>
+        <p:txBody>
+          <a:bodyPr/>
+          <a:lstStyle/>
+          <a:p>
+            <a:endParaRPr lang="en-US"/>
+          </a:p>
+        </p:txBody>
+      </p:sp>
+    </p:spTree>
+  </p:cSld>
+  <p:clrMapOvr>
+    <a:masterClrMapping/>
+  </p:clrMapOvr>
+  <p:timing>
+    <p:tnLst>
+      <p:par>
+        <p:cTn id="1" dur="indefinite" restart="never" nodeType="tmRoot"/>
+      </p:par>
+    </p:tnLst>
+  </p:timing>
+</p:sld>
+</file>
+
+<file path=ppt/slides/slide12.xml><?xml version="1.0" encoding="utf-8"?>
+<p:sld xmlns:a="http://schemas.openxmlformats.org/drawingml/2006/main" xmlns:r="http://schemas.openxmlformats.org/officeDocument/2006/relationships" xmlns:p="http://schemas.openxmlformats.org/presentationml/2006/main">
+  <p:cSld>
+    <p:spTree>
+      <p:nvGrpSpPr>
+        <p:cNvPr id="1" name=""/>
+        <p:cNvGrpSpPr/>
+        <p:nvPr/>
+      </p:nvGrpSpPr>
+      <p:grpSpPr>
+        <a:xfrm>
+          <a:off x="0" y="0"/>
+          <a:ext cx="0" cy="0"/>
+          <a:chOff x="0" y="0"/>
+          <a:chExt cx="0" cy="0"/>
+        </a:xfrm>
+      </p:grpSpPr>
+      <p:sp>
+        <p:nvSpPr>
+          <p:cNvPr id="2" name="Title 1"/>
+          <p:cNvSpPr>
+            <a:spLocks noGrp="1"/>
+          </p:cNvSpPr>
+          <p:nvPr>
+            <p:ph type="title"/>
+          </p:nvPr>
+        </p:nvSpPr>
+        <p:spPr/>
+        <p:txBody>
+          <a:bodyPr/>
+          <a:lstStyle/>
+          <a:p>
+            <a:r>
+              <a:rPr lang="en-US" dirty="0" smtClean="0"/>
               <a:t>Map Comparisons</a:t>
             </a:r>
             <a:endParaRPr lang="en-US" dirty="0"/>
@@ -12491,7 +12616,7 @@
 </p:sld>
 </file>
 
-<file path=ppt/slides/slide12.xml><?xml version="1.0" encoding="utf-8"?>
+<file path=ppt/slides/slide13.xml><?xml version="1.0" encoding="utf-8"?>
 <p:sld xmlns:a="http://schemas.openxmlformats.org/drawingml/2006/main" xmlns:r="http://schemas.openxmlformats.org/officeDocument/2006/relationships" xmlns:p="http://schemas.openxmlformats.org/presentationml/2006/main">
   <p:cSld>
     <p:spTree>
@@ -12559,7 +12684,7 @@
 </p:sld>
 </file>
 
-<file path=ppt/slides/slide13.xml><?xml version="1.0" encoding="utf-8"?>
+<file path=ppt/slides/slide14.xml><?xml version="1.0" encoding="utf-8"?>
 <p:sld xmlns:a="http://schemas.openxmlformats.org/drawingml/2006/main" xmlns:r="http://schemas.openxmlformats.org/officeDocument/2006/relationships" xmlns:p="http://schemas.openxmlformats.org/presentationml/2006/main">
   <p:cSld>
     <p:spTree>
@@ -13013,7 +13138,7 @@
 </p:sld>
 </file>
 
-<file path=ppt/slides/slide14.xml><?xml version="1.0" encoding="utf-8"?>
+<file path=ppt/slides/slide15.xml><?xml version="1.0" encoding="utf-8"?>
 <p:sld xmlns:a="http://schemas.openxmlformats.org/drawingml/2006/main" xmlns:r="http://schemas.openxmlformats.org/officeDocument/2006/relationships" xmlns:p="http://schemas.openxmlformats.org/presentationml/2006/main">
   <p:cSld>
     <p:spTree>
@@ -13239,7 +13364,7 @@
 </p:sld>
 </file>
 
-<file path=ppt/slides/slide15.xml><?xml version="1.0" encoding="utf-8"?>
+<file path=ppt/slides/slide16.xml><?xml version="1.0" encoding="utf-8"?>
 <p:sld xmlns:a="http://schemas.openxmlformats.org/drawingml/2006/main" xmlns:r="http://schemas.openxmlformats.org/officeDocument/2006/relationships" xmlns:p="http://schemas.openxmlformats.org/presentationml/2006/main">
   <p:cSld>
     <p:spTree>
@@ -13465,7 +13590,7 @@
 </p:sld>
 </file>
 
-<file path=ppt/slides/slide16.xml><?xml version="1.0" encoding="utf-8"?>
+<file path=ppt/slides/slide17.xml><?xml version="1.0" encoding="utf-8"?>
 <p:sld xmlns:a="http://schemas.openxmlformats.org/drawingml/2006/main" xmlns:r="http://schemas.openxmlformats.org/officeDocument/2006/relationships" xmlns:p="http://schemas.openxmlformats.org/presentationml/2006/main">
   <p:cSld>
     <p:spTree>
@@ -13706,11 +13831,7 @@
                     <a:p>
                       <a:r>
                         <a:rPr lang="en-US" dirty="0" smtClean="0"/>
-                        <a:t>Inc.</a:t>
-                      </a:r>
-                      <a:r>
-                        <a:rPr lang="en-US" dirty="0" smtClean="0"/>
-                        <a:t> Health</a:t>
+                        <a:t>Inc. Health</a:t>
                       </a:r>
                       <a:r>
                         <a:rPr lang="en-US" baseline="0" dirty="0" smtClean="0"/>
@@ -14011,7 +14132,7 @@
 </p:sld>
 </file>
 
-<file path=ppt/slides/slide17.xml><?xml version="1.0" encoding="utf-8"?>
+<file path=ppt/slides/slide18.xml><?xml version="1.0" encoding="utf-8"?>
 <p:sld xmlns:a="http://schemas.openxmlformats.org/drawingml/2006/main" xmlns:r="http://schemas.openxmlformats.org/officeDocument/2006/relationships" xmlns:p="http://schemas.openxmlformats.org/presentationml/2006/main">
   <p:cSld>
     <p:spTree>
@@ -15546,226 +15667,6 @@
 </p:sld>
 </file>
 
-<file path=ppt/slides/slide18.xml><?xml version="1.0" encoding="utf-8"?>
-<p:sld xmlns:a="http://schemas.openxmlformats.org/drawingml/2006/main" xmlns:r="http://schemas.openxmlformats.org/officeDocument/2006/relationships" xmlns:p="http://schemas.openxmlformats.org/presentationml/2006/main">
-  <p:cSld>
-    <p:spTree>
-      <p:nvGrpSpPr>
-        <p:cNvPr id="1" name=""/>
-        <p:cNvGrpSpPr/>
-        <p:nvPr/>
-      </p:nvGrpSpPr>
-      <p:grpSpPr>
-        <a:xfrm>
-          <a:off x="0" y="0"/>
-          <a:ext cx="0" cy="0"/>
-          <a:chOff x="0" y="0"/>
-          <a:chExt cx="0" cy="0"/>
-        </a:xfrm>
-      </p:grpSpPr>
-      <p:sp>
-        <p:nvSpPr>
-          <p:cNvPr id="2" name="Title 1"/>
-          <p:cNvSpPr>
-            <a:spLocks noGrp="1"/>
-          </p:cNvSpPr>
-          <p:nvPr>
-            <p:ph type="title"/>
-          </p:nvPr>
-        </p:nvSpPr>
-        <p:spPr/>
-        <p:txBody>
-          <a:bodyPr/>
-          <a:lstStyle/>
-          <a:p>
-            <a:r>
-              <a:rPr lang="en-US" dirty="0" smtClean="0"/>
-              <a:t>Post-Mortem</a:t>
-            </a:r>
-            <a:endParaRPr lang="en-US" dirty="0"/>
-          </a:p>
-        </p:txBody>
-      </p:sp>
-      <p:sp>
-        <p:nvSpPr>
-          <p:cNvPr id="4" name="Text Placeholder 3"/>
-          <p:cNvSpPr>
-            <a:spLocks noGrp="1"/>
-          </p:cNvSpPr>
-          <p:nvPr>
-            <p:ph type="body" idx="1"/>
-          </p:nvPr>
-        </p:nvSpPr>
-        <p:spPr/>
-        <p:txBody>
-          <a:bodyPr/>
-          <a:lstStyle/>
-          <a:p>
-            <a:r>
-              <a:rPr lang="en-US" dirty="0" smtClean="0"/>
-              <a:t>Did Get In</a:t>
-            </a:r>
-            <a:endParaRPr lang="en-US" dirty="0"/>
-          </a:p>
-        </p:txBody>
-      </p:sp>
-      <p:sp>
-        <p:nvSpPr>
-          <p:cNvPr id="5" name="Text Placeholder 4"/>
-          <p:cNvSpPr>
-            <a:spLocks noGrp="1"/>
-          </p:cNvSpPr>
-          <p:nvPr>
-            <p:ph type="body" sz="half" idx="3"/>
-          </p:nvPr>
-        </p:nvSpPr>
-        <p:spPr/>
-        <p:txBody>
-          <a:bodyPr/>
-          <a:lstStyle/>
-          <a:p>
-            <a:r>
-              <a:rPr lang="en-US" dirty="0" smtClean="0"/>
-              <a:t>Did Not Get In</a:t>
-            </a:r>
-            <a:endParaRPr lang="en-US" dirty="0"/>
-          </a:p>
-        </p:txBody>
-      </p:sp>
-      <p:sp>
-        <p:nvSpPr>
-          <p:cNvPr id="3" name="Content Placeholder 2"/>
-          <p:cNvSpPr>
-            <a:spLocks noGrp="1"/>
-          </p:cNvSpPr>
-          <p:nvPr>
-            <p:ph sz="quarter" idx="2"/>
-          </p:nvPr>
-        </p:nvSpPr>
-        <p:spPr/>
-        <p:txBody>
-          <a:bodyPr>
-            <a:normAutofit/>
-          </a:bodyPr>
-          <a:lstStyle/>
-          <a:p>
-            <a:r>
-              <a:rPr lang="en-US" dirty="0" smtClean="0"/>
-              <a:t>Large World</a:t>
-            </a:r>
-          </a:p>
-          <a:p>
-            <a:pPr>
-              <a:buNone/>
-            </a:pPr>
-            <a:endParaRPr lang="en-US" dirty="0" smtClean="0"/>
-          </a:p>
-          <a:p>
-            <a:r>
-              <a:rPr lang="en-US" dirty="0" smtClean="0"/>
-              <a:t>Dynamic Enemies</a:t>
-            </a:r>
-          </a:p>
-          <a:p>
-            <a:endParaRPr lang="en-US" dirty="0" smtClean="0"/>
-          </a:p>
-          <a:p>
-            <a:r>
-              <a:rPr lang="en-US" dirty="0" smtClean="0"/>
-              <a:t>Genre-specific Entertaining </a:t>
-            </a:r>
-            <a:r>
-              <a:rPr lang="en-US" dirty="0" err="1" smtClean="0"/>
-              <a:t>Gameplay</a:t>
-            </a:r>
-            <a:endParaRPr lang="en-US" dirty="0" smtClean="0"/>
-          </a:p>
-          <a:p>
-            <a:endParaRPr lang="en-US" dirty="0" smtClean="0"/>
-          </a:p>
-          <a:p>
-            <a:r>
-              <a:rPr lang="en-US" dirty="0" smtClean="0"/>
-              <a:t>All Single-Player Skills</a:t>
-            </a:r>
-          </a:p>
-        </p:txBody>
-      </p:sp>
-      <p:sp>
-        <p:nvSpPr>
-          <p:cNvPr id="6" name="Content Placeholder 5"/>
-          <p:cNvSpPr>
-            <a:spLocks noGrp="1"/>
-          </p:cNvSpPr>
-          <p:nvPr>
-            <p:ph sz="quarter" idx="4"/>
-          </p:nvPr>
-        </p:nvSpPr>
-        <p:spPr/>
-        <p:txBody>
-          <a:bodyPr>
-            <a:normAutofit/>
-          </a:bodyPr>
-          <a:lstStyle/>
-          <a:p>
-            <a:r>
-              <a:rPr lang="en-US" dirty="0" smtClean="0"/>
-              <a:t>Multiplayer</a:t>
-            </a:r>
-          </a:p>
-          <a:p>
-            <a:r>
-              <a:rPr lang="en-US" dirty="0" smtClean="0"/>
-              <a:t>Magic Combos</a:t>
-            </a:r>
-          </a:p>
-          <a:p>
-            <a:r>
-              <a:rPr lang="en-US" dirty="0" smtClean="0"/>
-              <a:t>Shops</a:t>
-            </a:r>
-          </a:p>
-          <a:p>
-            <a:r>
-              <a:rPr lang="en-US" dirty="0" smtClean="0"/>
-              <a:t>Different Quality of Skills</a:t>
-            </a:r>
-          </a:p>
-          <a:p>
-            <a:r>
-              <a:rPr lang="en-US" dirty="0" smtClean="0"/>
-              <a:t>Original Ideas of Skills</a:t>
-            </a:r>
-          </a:p>
-          <a:p>
-            <a:r>
-              <a:rPr lang="en-US" dirty="0" smtClean="0"/>
-              <a:t>Better AI</a:t>
-            </a:r>
-          </a:p>
-          <a:p>
-            <a:r>
-              <a:rPr lang="en-US" dirty="0" smtClean="0"/>
-              <a:t>Extra Worlds</a:t>
-            </a:r>
-          </a:p>
-        </p:txBody>
-      </p:sp>
-    </p:spTree>
-  </p:cSld>
-  <p:clrMapOvr>
-    <a:masterClrMapping/>
-  </p:clrMapOvr>
-  <p:timing>
-    <p:tnLst>
-      <p:par>
-        <p:cTn id="1" dur="indefinite" restart="never" nodeType="tmRoot"/>
-      </p:par>
-    </p:tnLst>
-  </p:timing>
-</p:sld>
-</file>
-
 <file path=ppt/slides/slide19.xml><?xml version="1.0" encoding="utf-8"?>
 <p:sld xmlns:a="http://schemas.openxmlformats.org/drawingml/2006/main" xmlns:r="http://schemas.openxmlformats.org/officeDocument/2006/relationships" xmlns:p="http://schemas.openxmlformats.org/presentationml/2006/main">
   <p:cSld>
@@ -15800,7 +15701,53 @@
           <a:p>
             <a:r>
               <a:rPr lang="en-US" dirty="0" smtClean="0"/>
-              <a:t>Future Plans</a:t>
+              <a:t>Post-Mortem</a:t>
+            </a:r>
+            <a:endParaRPr lang="en-US" dirty="0"/>
+          </a:p>
+        </p:txBody>
+      </p:sp>
+      <p:sp>
+        <p:nvSpPr>
+          <p:cNvPr id="4" name="Text Placeholder 3"/>
+          <p:cNvSpPr>
+            <a:spLocks noGrp="1"/>
+          </p:cNvSpPr>
+          <p:nvPr>
+            <p:ph type="body" idx="1"/>
+          </p:nvPr>
+        </p:nvSpPr>
+        <p:spPr/>
+        <p:txBody>
+          <a:bodyPr/>
+          <a:lstStyle/>
+          <a:p>
+            <a:r>
+              <a:rPr lang="en-US" dirty="0" smtClean="0"/>
+              <a:t>Did Get In</a:t>
+            </a:r>
+            <a:endParaRPr lang="en-US" dirty="0"/>
+          </a:p>
+        </p:txBody>
+      </p:sp>
+      <p:sp>
+        <p:nvSpPr>
+          <p:cNvPr id="5" name="Text Placeholder 4"/>
+          <p:cNvSpPr>
+            <a:spLocks noGrp="1"/>
+          </p:cNvSpPr>
+          <p:nvPr>
+            <p:ph type="body" sz="half" idx="3"/>
+          </p:nvPr>
+        </p:nvSpPr>
+        <p:spPr/>
+        <p:txBody>
+          <a:bodyPr/>
+          <a:lstStyle/>
+          <a:p>
+            <a:r>
+              <a:rPr lang="en-US" dirty="0" smtClean="0"/>
+              <a:t>Did Not Get In</a:t>
             </a:r>
             <a:endParaRPr lang="en-US" dirty="0"/>
           </a:p>
@@ -15813,7 +15760,7 @@
             <a:spLocks noGrp="1"/>
           </p:cNvSpPr>
           <p:nvPr>
-            <p:ph idx="1"/>
+            <p:ph sz="quarter" idx="2"/>
           </p:nvPr>
         </p:nvSpPr>
         <p:spPr/>
@@ -15825,16 +15772,19 @@
           <a:p>
             <a:r>
               <a:rPr lang="en-US" dirty="0" smtClean="0"/>
-              <a:t>Get in Three Remaining Worlds</a:t>
-            </a:r>
-          </a:p>
-          <a:p>
+              <a:t>Large World</a:t>
+            </a:r>
+          </a:p>
+          <a:p>
+            <a:pPr>
+              <a:buNone/>
+            </a:pPr>
             <a:endParaRPr lang="en-US" dirty="0" smtClean="0"/>
           </a:p>
           <a:p>
             <a:r>
               <a:rPr lang="en-US" dirty="0" smtClean="0"/>
-              <a:t>Functioning Multiplayer</a:t>
+              <a:t>Dynamic Enemies</a:t>
             </a:r>
           </a:p>
           <a:p>
@@ -15843,16 +15793,81 @@
           <a:p>
             <a:r>
               <a:rPr lang="en-US" dirty="0" smtClean="0"/>
-              <a:t>Better Character Art</a:t>
-            </a:r>
-          </a:p>
-          <a:p>
+              <a:t>Genre-specific Entertaining </a:t>
+            </a:r>
+            <a:r>
+              <a:rPr lang="en-US" dirty="0" err="1" smtClean="0"/>
+              <a:t>Gameplay</a:t>
+            </a:r>
             <a:endParaRPr lang="en-US" dirty="0" smtClean="0"/>
           </a:p>
           <a:p>
+            <a:endParaRPr lang="en-US" dirty="0" smtClean="0"/>
+          </a:p>
+          <a:p>
             <a:r>
               <a:rPr lang="en-US" dirty="0" smtClean="0"/>
-              <a:t>BALANCE!!!!!</a:t>
+              <a:t>All Single-Player Skills</a:t>
+            </a:r>
+          </a:p>
+        </p:txBody>
+      </p:sp>
+      <p:sp>
+        <p:nvSpPr>
+          <p:cNvPr id="6" name="Content Placeholder 5"/>
+          <p:cNvSpPr>
+            <a:spLocks noGrp="1"/>
+          </p:cNvSpPr>
+          <p:nvPr>
+            <p:ph sz="quarter" idx="4"/>
+          </p:nvPr>
+        </p:nvSpPr>
+        <p:spPr/>
+        <p:txBody>
+          <a:bodyPr>
+            <a:normAutofit/>
+          </a:bodyPr>
+          <a:lstStyle/>
+          <a:p>
+            <a:r>
+              <a:rPr lang="en-US" dirty="0" smtClean="0"/>
+              <a:t>Multiplayer</a:t>
+            </a:r>
+          </a:p>
+          <a:p>
+            <a:r>
+              <a:rPr lang="en-US" dirty="0" smtClean="0"/>
+              <a:t>Magic Combos</a:t>
+            </a:r>
+          </a:p>
+          <a:p>
+            <a:r>
+              <a:rPr lang="en-US" dirty="0" smtClean="0"/>
+              <a:t>Shops</a:t>
+            </a:r>
+          </a:p>
+          <a:p>
+            <a:r>
+              <a:rPr lang="en-US" dirty="0" smtClean="0"/>
+              <a:t>Different Quality of Skills</a:t>
+            </a:r>
+          </a:p>
+          <a:p>
+            <a:r>
+              <a:rPr lang="en-US" dirty="0" smtClean="0"/>
+              <a:t>Original Ideas of Skills</a:t>
+            </a:r>
+          </a:p>
+          <a:p>
+            <a:r>
+              <a:rPr lang="en-US" dirty="0" smtClean="0"/>
+              <a:t>Better AI</a:t>
+            </a:r>
+          </a:p>
+          <a:p>
+            <a:r>
+              <a:rPr lang="en-US" dirty="0" smtClean="0"/>
+              <a:t>Extra Worlds</a:t>
             </a:r>
           </a:p>
         </p:txBody>
@@ -16197,6 +16212,112 @@
           <a:p>
             <a:r>
               <a:rPr lang="en-US" dirty="0" smtClean="0"/>
+              <a:t>Future Plans</a:t>
+            </a:r>
+            <a:endParaRPr lang="en-US" dirty="0"/>
+          </a:p>
+        </p:txBody>
+      </p:sp>
+      <p:sp>
+        <p:nvSpPr>
+          <p:cNvPr id="3" name="Content Placeholder 2"/>
+          <p:cNvSpPr>
+            <a:spLocks noGrp="1"/>
+          </p:cNvSpPr>
+          <p:nvPr>
+            <p:ph idx="1"/>
+          </p:nvPr>
+        </p:nvSpPr>
+        <p:spPr/>
+        <p:txBody>
+          <a:bodyPr>
+            <a:normAutofit/>
+          </a:bodyPr>
+          <a:lstStyle/>
+          <a:p>
+            <a:r>
+              <a:rPr lang="en-US" dirty="0" smtClean="0"/>
+              <a:t>Get in Three Remaining Worlds</a:t>
+            </a:r>
+          </a:p>
+          <a:p>
+            <a:endParaRPr lang="en-US" dirty="0" smtClean="0"/>
+          </a:p>
+          <a:p>
+            <a:r>
+              <a:rPr lang="en-US" dirty="0" smtClean="0"/>
+              <a:t>Functioning Multiplayer</a:t>
+            </a:r>
+          </a:p>
+          <a:p>
+            <a:endParaRPr lang="en-US" dirty="0" smtClean="0"/>
+          </a:p>
+          <a:p>
+            <a:r>
+              <a:rPr lang="en-US" dirty="0" smtClean="0"/>
+              <a:t>Better Character Art</a:t>
+            </a:r>
+          </a:p>
+          <a:p>
+            <a:endParaRPr lang="en-US" dirty="0" smtClean="0"/>
+          </a:p>
+          <a:p>
+            <a:r>
+              <a:rPr lang="en-US" dirty="0" smtClean="0"/>
+              <a:t>BALANCE!!!!!</a:t>
+            </a:r>
+          </a:p>
+        </p:txBody>
+      </p:sp>
+    </p:spTree>
+  </p:cSld>
+  <p:clrMapOvr>
+    <a:masterClrMapping/>
+  </p:clrMapOvr>
+  <p:timing>
+    <p:tnLst>
+      <p:par>
+        <p:cTn id="1" dur="indefinite" restart="never" nodeType="tmRoot"/>
+      </p:par>
+    </p:tnLst>
+  </p:timing>
+</p:sld>
+</file>
+
+<file path=ppt/slides/slide21.xml><?xml version="1.0" encoding="utf-8"?>
+<p:sld xmlns:a="http://schemas.openxmlformats.org/drawingml/2006/main" xmlns:r="http://schemas.openxmlformats.org/officeDocument/2006/relationships" xmlns:p="http://schemas.openxmlformats.org/presentationml/2006/main">
+  <p:cSld>
+    <p:spTree>
+      <p:nvGrpSpPr>
+        <p:cNvPr id="1" name=""/>
+        <p:cNvGrpSpPr/>
+        <p:nvPr/>
+      </p:nvGrpSpPr>
+      <p:grpSpPr>
+        <a:xfrm>
+          <a:off x="0" y="0"/>
+          <a:ext cx="0" cy="0"/>
+          <a:chOff x="0" y="0"/>
+          <a:chExt cx="0" cy="0"/>
+        </a:xfrm>
+      </p:grpSpPr>
+      <p:sp>
+        <p:nvSpPr>
+          <p:cNvPr id="2" name="Title 1"/>
+          <p:cNvSpPr>
+            <a:spLocks noGrp="1"/>
+          </p:cNvSpPr>
+          <p:nvPr>
+            <p:ph type="title"/>
+          </p:nvPr>
+        </p:nvSpPr>
+        <p:spPr/>
+        <p:txBody>
+          <a:bodyPr/>
+          <a:lstStyle/>
+          <a:p>
+            <a:r>
+              <a:rPr lang="en-US" dirty="0" smtClean="0"/>
               <a:t>Demo and Questions</a:t>
             </a:r>
             <a:endParaRPr lang="en-US" dirty="0"/>
@@ -17184,7 +17305,7 @@
           <a:p>
             <a:r>
               <a:rPr lang="en-US" dirty="0" smtClean="0"/>
-              <a:t>Matthew Morrill</a:t>
+              <a:t>Playable Characters</a:t>
             </a:r>
             <a:endParaRPr lang="en-US" dirty="0"/>
           </a:p>
@@ -17202,60 +17323,151 @@
         </p:nvSpPr>
         <p:spPr/>
         <p:txBody>
-          <a:bodyPr>
-            <a:normAutofit/>
-          </a:bodyPr>
+          <a:bodyPr/>
           <a:lstStyle/>
           <a:p>
             <a:r>
               <a:rPr lang="en-US" dirty="0" smtClean="0"/>
-              <a:t>Started the scripting</a:t>
-            </a:r>
+              <a:t>Hybrid : +1 Strength +1 Intellect</a:t>
+            </a:r>
+          </a:p>
+          <a:p>
+            <a:endParaRPr lang="en-US" dirty="0" smtClean="0"/>
           </a:p>
           <a:p>
             <a:r>
               <a:rPr lang="en-US" dirty="0" smtClean="0"/>
-              <a:t>Designed NPC’s, UI, HUD, World, Grid</a:t>
-            </a:r>
+              <a:t>Caster : +2 Intellect</a:t>
+            </a:r>
+          </a:p>
+          <a:p>
+            <a:endParaRPr lang="en-US" dirty="0" smtClean="0"/>
           </a:p>
           <a:p>
             <a:r>
               <a:rPr lang="en-US" dirty="0" smtClean="0"/>
-              <a:t>Almost entirety of </a:t>
-            </a:r>
-            <a:r>
-              <a:rPr lang="en-US" dirty="0" err="1" smtClean="0"/>
-              <a:t>baseEngine</a:t>
-            </a:r>
-            <a:endParaRPr lang="en-US" dirty="0" smtClean="0"/>
-          </a:p>
-          <a:p>
-            <a:r>
-              <a:rPr lang="en-US" dirty="0" smtClean="0"/>
-              <a:t>Second networking person</a:t>
-            </a:r>
-          </a:p>
-          <a:p>
-            <a:r>
-              <a:rPr lang="en-US" dirty="0" smtClean="0"/>
-              <a:t>NBAI – Not Be An Idiot</a:t>
+              <a:t>Tank : +2 Strength</a:t>
             </a:r>
             <a:endParaRPr lang="en-US" dirty="0"/>
           </a:p>
         </p:txBody>
       </p:sp>
+      <p:pic>
+        <p:nvPicPr>
+          <p:cNvPr id="1027" name="Picture 3" descr="C:\Users\Alex\Desktop\player1.png"/>
+          <p:cNvPicPr>
+            <a:picLocks noChangeAspect="1" noChangeArrowheads="1"/>
+          </p:cNvPicPr>
+          <p:nvPr/>
+        </p:nvPicPr>
+        <p:blipFill>
+          <a:blip r:embed="rId2">
+            <a:clrChange>
+              <a:clrFrom>
+                <a:srgbClr val="FFFFFF"/>
+              </a:clrFrom>
+              <a:clrTo>
+                <a:srgbClr val="FFFFFF">
+                  <a:alpha val="0"/>
+                </a:srgbClr>
+              </a:clrTo>
+            </a:clrChange>
+          </a:blip>
+          <a:srcRect/>
+          <a:stretch>
+            <a:fillRect/>
+          </a:stretch>
+        </p:blipFill>
+        <p:spPr bwMode="auto">
+          <a:xfrm>
+            <a:off x="6781800" y="2743200"/>
+            <a:ext cx="457200" cy="685800"/>
+          </a:xfrm>
+          <a:prstGeom prst="rect">
+            <a:avLst/>
+          </a:prstGeom>
+          <a:noFill/>
+        </p:spPr>
+      </p:pic>
+      <p:pic>
+        <p:nvPicPr>
+          <p:cNvPr id="1028" name="Picture 4" descr="C:\Users\Alex\Desktop\player2.png"/>
+          <p:cNvPicPr>
+            <a:picLocks noChangeAspect="1" noChangeArrowheads="1"/>
+          </p:cNvPicPr>
+          <p:nvPr/>
+        </p:nvPicPr>
+        <p:blipFill>
+          <a:blip r:embed="rId3">
+            <a:clrChange>
+              <a:clrFrom>
+                <a:srgbClr val="FFFFFF"/>
+              </a:clrFrom>
+              <a:clrTo>
+                <a:srgbClr val="FFFFFF">
+                  <a:alpha val="0"/>
+                </a:srgbClr>
+              </a:clrTo>
+            </a:clrChange>
+          </a:blip>
+          <a:srcRect/>
+          <a:stretch>
+            <a:fillRect/>
+          </a:stretch>
+        </p:blipFill>
+        <p:spPr bwMode="auto">
+          <a:xfrm>
+            <a:off x="6760464" y="3810000"/>
+            <a:ext cx="478536" cy="664633"/>
+          </a:xfrm>
+          <a:prstGeom prst="rect">
+            <a:avLst/>
+          </a:prstGeom>
+          <a:noFill/>
+        </p:spPr>
+      </p:pic>
+      <p:pic>
+        <p:nvPicPr>
+          <p:cNvPr id="1029" name="Picture 5" descr="C:\Users\Alex\Desktop\player0.png"/>
+          <p:cNvPicPr>
+            <a:picLocks noChangeAspect="1" noChangeArrowheads="1"/>
+          </p:cNvPicPr>
+          <p:nvPr/>
+        </p:nvPicPr>
+        <p:blipFill>
+          <a:blip r:embed="rId4">
+            <a:clrChange>
+              <a:clrFrom>
+                <a:srgbClr val="FFFFFF"/>
+              </a:clrFrom>
+              <a:clrTo>
+                <a:srgbClr val="FFFFFF">
+                  <a:alpha val="0"/>
+                </a:srgbClr>
+              </a:clrTo>
+            </a:clrChange>
+          </a:blip>
+          <a:srcRect/>
+          <a:stretch>
+            <a:fillRect/>
+          </a:stretch>
+        </p:blipFill>
+        <p:spPr bwMode="auto">
+          <a:xfrm>
+            <a:off x="6781800" y="1600200"/>
+            <a:ext cx="457200" cy="685800"/>
+          </a:xfrm>
+          <a:prstGeom prst="rect">
+            <a:avLst/>
+          </a:prstGeom>
+          <a:noFill/>
+        </p:spPr>
+      </p:pic>
     </p:spTree>
   </p:cSld>
   <p:clrMapOvr>
     <a:masterClrMapping/>
   </p:clrMapOvr>
-  <p:timing>
-    <p:tnLst>
-      <p:par>
-        <p:cTn id="1" dur="indefinite" restart="never" nodeType="tmRoot"/>
-      </p:par>
-    </p:tnLst>
-  </p:timing>
 </p:sld>
 </file>
 
@@ -17293,7 +17505,7 @@
           <a:p>
             <a:r>
               <a:rPr lang="en-US" dirty="0" smtClean="0"/>
-              <a:t>John Parks</a:t>
+              <a:t>Matthew Morrill</a:t>
             </a:r>
             <a:endParaRPr lang="en-US" dirty="0"/>
           </a:p>
@@ -17318,53 +17530,38 @@
           <a:p>
             <a:r>
               <a:rPr lang="en-US" dirty="0" smtClean="0"/>
-              <a:t>Designed Chip, Armor, Magic, Weapon</a:t>
+              <a:t>Started the scripting</a:t>
             </a:r>
           </a:p>
           <a:p>
             <a:r>
               <a:rPr lang="en-US" dirty="0" smtClean="0"/>
-              <a:t>Added Player’s Inventories</a:t>
-            </a:r>
-          </a:p>
-          <a:p>
-            <a:pPr lvl="1"/>
+              <a:t>Designed NPC’s, UI, HUD, World, Grid</a:t>
+            </a:r>
+          </a:p>
+          <a:p>
             <a:r>
               <a:rPr lang="en-US" dirty="0" smtClean="0"/>
-              <a:t>Armor Inv for Collected Armor</a:t>
-            </a:r>
-          </a:p>
-          <a:p>
-            <a:pPr lvl="1"/>
+              <a:t>Almost entirety of </a:t>
+            </a:r>
+            <a:r>
+              <a:rPr lang="en-US" dirty="0" err="1" smtClean="0"/>
+              <a:t>baseEngine</a:t>
+            </a:r>
+            <a:endParaRPr lang="en-US" dirty="0" smtClean="0"/>
+          </a:p>
+          <a:p>
             <a:r>
               <a:rPr lang="en-US" dirty="0" smtClean="0"/>
-              <a:t>Attack Inv for Unlocked Magic &amp; Weapons</a:t>
-            </a:r>
-          </a:p>
-          <a:p>
-            <a:pPr lvl="1"/>
+              <a:t>Second networking person</a:t>
+            </a:r>
+          </a:p>
+          <a:p>
             <a:r>
               <a:rPr lang="en-US" dirty="0" smtClean="0"/>
-              <a:t>Gauntlet Inv for Equipped Attacks &amp; Armor</a:t>
-            </a:r>
-          </a:p>
-          <a:p>
-            <a:r>
-              <a:rPr lang="en-US" dirty="0" smtClean="0"/>
-              <a:t>Gave Boss Ability to Use 3 Attacks</a:t>
-            </a:r>
-          </a:p>
-          <a:p>
-            <a:r>
-              <a:rPr lang="en-US" dirty="0" smtClean="0"/>
-              <a:t>Worked with Entity &amp; Chip Collision</a:t>
-            </a:r>
-          </a:p>
-          <a:p>
-            <a:r>
-              <a:rPr lang="en-US" dirty="0" smtClean="0"/>
-              <a:t>Filled Out Other Classes</a:t>
-            </a:r>
+              <a:t>NBAI – Not Be An Idiot</a:t>
+            </a:r>
+            <a:endParaRPr lang="en-US" dirty="0"/>
           </a:p>
         </p:txBody>
       </p:sp>

</xml_diff>